<commit_message>
updated ppt with results
</commit_message>
<xml_diff>
--- a/Progress Update_2.pptx
+++ b/Progress Update_2.pptx
@@ -5,19 +5,21 @@
     <p:sldMasterId id="2147483648" r:id="rId4"/>
   </p:sldMasterIdLst>
   <p:notesMasterIdLst>
-    <p:notesMasterId r:id="rId12"/>
+    <p:notesMasterId r:id="rId14"/>
   </p:notesMasterIdLst>
   <p:handoutMasterIdLst>
-    <p:handoutMasterId r:id="rId13"/>
+    <p:handoutMasterId r:id="rId15"/>
   </p:handoutMasterIdLst>
   <p:sldIdLst>
     <p:sldId id="256" r:id="rId5"/>
     <p:sldId id="287" r:id="rId6"/>
     <p:sldId id="288" r:id="rId7"/>
-    <p:sldId id="266" r:id="rId8"/>
-    <p:sldId id="289" r:id="rId9"/>
-    <p:sldId id="290" r:id="rId10"/>
-    <p:sldId id="268" r:id="rId11"/>
+    <p:sldId id="291" r:id="rId8"/>
+    <p:sldId id="292" r:id="rId9"/>
+    <p:sldId id="293" r:id="rId10"/>
+    <p:sldId id="289" r:id="rId11"/>
+    <p:sldId id="290" r:id="rId12"/>
+    <p:sldId id="268" r:id="rId13"/>
   </p:sldIdLst>
   <p:sldSz cx="12192000" cy="6858000"/>
   <p:notesSz cx="6858000" cy="9144000"/>
@@ -136,6 +138,1168 @@
     </p:ext>
   </p:extLst>
 </p:presentation>
+</file>
+
+<file path=ppt/charts/chart1.xml><?xml version="1.0" encoding="utf-8"?>
+<c:chartSpace xmlns:c="http://schemas.openxmlformats.org/drawingml/2006/chart" xmlns:a="http://schemas.openxmlformats.org/drawingml/2006/main" xmlns:r="http://schemas.openxmlformats.org/officeDocument/2006/relationships" xmlns:c16r2="http://schemas.microsoft.com/office/drawing/2015/06/chart">
+  <c:date1904 val="0"/>
+  <c:lang val="en-US"/>
+  <c:roundedCorners val="0"/>
+  <mc:AlternateContent xmlns:mc="http://schemas.openxmlformats.org/markup-compatibility/2006">
+    <mc:Choice xmlns:c14="http://schemas.microsoft.com/office/drawing/2007/8/2/chart" Requires="c14">
+      <c14:style val="102"/>
+    </mc:Choice>
+    <mc:Fallback>
+      <c:style val="2"/>
+    </mc:Fallback>
+  </mc:AlternateContent>
+  <c:chart>
+    <c:title>
+      <c:overlay val="0"/>
+      <c:spPr>
+        <a:noFill/>
+        <a:ln>
+          <a:noFill/>
+        </a:ln>
+        <a:effectLst/>
+      </c:spPr>
+      <c:txPr>
+        <a:bodyPr rot="0" spcFirstLastPara="1" vertOverflow="ellipsis" vert="horz" wrap="square" anchor="ctr" anchorCtr="1"/>
+        <a:lstStyle/>
+        <a:p>
+          <a:pPr>
+            <a:defRPr sz="1862" b="1" i="0" u="none" strike="noStrike" kern="1200" cap="none" baseline="0">
+              <a:solidFill>
+                <a:schemeClr val="lt1">
+                  <a:lumMod val="85000"/>
+                </a:schemeClr>
+              </a:solidFill>
+              <a:latin typeface="+mn-lt"/>
+              <a:ea typeface="+mn-ea"/>
+              <a:cs typeface="+mn-cs"/>
+            </a:defRPr>
+          </a:pPr>
+          <a:endParaRPr lang="en-US"/>
+        </a:p>
+      </c:txPr>
+    </c:title>
+    <c:autoTitleDeleted val="0"/>
+    <c:plotArea>
+      <c:layout/>
+      <c:barChart>
+        <c:barDir val="col"/>
+        <c:grouping val="clustered"/>
+        <c:varyColors val="0"/>
+        <c:ser>
+          <c:idx val="0"/>
+          <c:order val="0"/>
+          <c:tx>
+            <c:strRef>
+              <c:f>Sheet1!$B$1</c:f>
+              <c:strCache>
+                <c:ptCount val="1"/>
+                <c:pt idx="0">
+                  <c:v>MSE</c:v>
+                </c:pt>
+              </c:strCache>
+            </c:strRef>
+          </c:tx>
+          <c:spPr>
+            <a:noFill/>
+            <a:ln w="9525" cap="flat" cmpd="sng" algn="ctr">
+              <a:solidFill>
+                <a:schemeClr val="accent1"/>
+              </a:solidFill>
+              <a:miter lim="800000"/>
+            </a:ln>
+            <a:effectLst>
+              <a:glow rad="63500">
+                <a:schemeClr val="accent1">
+                  <a:satMod val="175000"/>
+                  <a:alpha val="25000"/>
+                </a:schemeClr>
+              </a:glow>
+            </a:effectLst>
+          </c:spPr>
+          <c:invertIfNegative val="0"/>
+          <c:dLbls>
+            <c:spPr>
+              <a:noFill/>
+              <a:ln>
+                <a:noFill/>
+              </a:ln>
+              <a:effectLst/>
+            </c:spPr>
+            <c:txPr>
+              <a:bodyPr rot="0" spcFirstLastPara="1" vertOverflow="ellipsis" vert="horz" wrap="square" lIns="38100" tIns="19050" rIns="38100" bIns="19050" anchor="ctr" anchorCtr="1">
+                <a:spAutoFit/>
+              </a:bodyPr>
+              <a:lstStyle/>
+              <a:p>
+                <a:pPr>
+                  <a:defRPr sz="1197" b="0" i="0" u="none" strike="noStrike" kern="1200" baseline="0">
+                    <a:solidFill>
+                      <a:schemeClr val="lt1">
+                        <a:lumMod val="75000"/>
+                      </a:schemeClr>
+                    </a:solidFill>
+                    <a:latin typeface="+mn-lt"/>
+                    <a:ea typeface="+mn-ea"/>
+                    <a:cs typeface="+mn-cs"/>
+                  </a:defRPr>
+                </a:pPr>
+                <a:endParaRPr lang="en-US"/>
+              </a:p>
+            </c:txPr>
+            <c:showLegendKey val="0"/>
+            <c:showVal val="1"/>
+            <c:showCatName val="0"/>
+            <c:showSerName val="0"/>
+            <c:showPercent val="0"/>
+            <c:showBubbleSize val="0"/>
+            <c:showLeaderLines val="0"/>
+            <c:extLst>
+              <c:ext xmlns:c15="http://schemas.microsoft.com/office/drawing/2012/chart" uri="{CE6537A1-D6FC-4f65-9D91-7224C49458BB}">
+                <c15:showLeaderLines val="1"/>
+                <c15:leaderLines>
+                  <c:spPr>
+                    <a:ln w="9525">
+                      <a:solidFill>
+                        <a:schemeClr val="lt1">
+                          <a:lumMod val="50000"/>
+                        </a:schemeClr>
+                      </a:solidFill>
+                      <a:round/>
+                    </a:ln>
+                    <a:effectLst/>
+                  </c:spPr>
+                </c15:leaderLines>
+              </c:ext>
+            </c:extLst>
+          </c:dLbls>
+          <c:cat>
+            <c:strRef>
+              <c:f>Sheet1!$A$2:$A$7</c:f>
+              <c:strCache>
+                <c:ptCount val="6"/>
+                <c:pt idx="0">
+                  <c:v>batch_size: 256, lr: 0.001, optimizer: Adam, image_size: 224x224</c:v>
+                </c:pt>
+                <c:pt idx="1">
+                  <c:v>batch_size: 256, lr: 0.0001, optimizer: Adam, image_size: 224x224</c:v>
+                </c:pt>
+                <c:pt idx="2">
+                  <c:v>batch_size: 256, lr: 0.0001, optimizer: SGD, image_size: 224x224</c:v>
+                </c:pt>
+                <c:pt idx="3">
+                  <c:v>batch_size: 64, lr: 0.001, optimizer: Adam, image_size: 224x224</c:v>
+                </c:pt>
+                <c:pt idx="4">
+                  <c:v>batch_size: 64, lr: 0.001, optimizer: Adam, image_size: 366x366</c:v>
+                </c:pt>
+                <c:pt idx="5">
+                  <c:v>batch_size: 64, lr: 0.0001, optimizer: Adam, image_size: 366x366</c:v>
+                </c:pt>
+              </c:strCache>
+            </c:strRef>
+          </c:cat>
+          <c:val>
+            <c:numRef>
+              <c:f>Sheet1!$B$2:$B$7</c:f>
+              <c:numCache>
+                <c:formatCode>General</c:formatCode>
+                <c:ptCount val="6"/>
+                <c:pt idx="0">
+                  <c:v>128.64699999999999</c:v>
+                </c:pt>
+                <c:pt idx="1">
+                  <c:v>130.90600000000001</c:v>
+                </c:pt>
+                <c:pt idx="2">
+                  <c:v>585.79499999999996</c:v>
+                </c:pt>
+                <c:pt idx="3">
+                  <c:v>131.33199999999999</c:v>
+                </c:pt>
+                <c:pt idx="4">
+                  <c:v>130.30000000000001</c:v>
+                </c:pt>
+                <c:pt idx="5">
+                  <c:v>135.648</c:v>
+                </c:pt>
+              </c:numCache>
+            </c:numRef>
+          </c:val>
+          <c:extLst>
+            <c:ext xmlns:c16="http://schemas.microsoft.com/office/drawing/2014/chart" uri="{C3380CC4-5D6E-409C-BE32-E72D297353CC}">
+              <c16:uniqueId val="{00000000-C3CF-4DDF-8C59-AEFE3C7B1CB1}"/>
+            </c:ext>
+          </c:extLst>
+        </c:ser>
+        <c:ser>
+          <c:idx val="1"/>
+          <c:order val="1"/>
+          <c:tx>
+            <c:strRef>
+              <c:f>Sheet1!$C$1</c:f>
+              <c:strCache>
+                <c:ptCount val="1"/>
+                <c:pt idx="0">
+                  <c:v>RMSE</c:v>
+                </c:pt>
+              </c:strCache>
+            </c:strRef>
+          </c:tx>
+          <c:spPr>
+            <a:noFill/>
+            <a:ln w="9525" cap="flat" cmpd="sng" algn="ctr">
+              <a:solidFill>
+                <a:schemeClr val="accent2"/>
+              </a:solidFill>
+              <a:miter lim="800000"/>
+            </a:ln>
+            <a:effectLst>
+              <a:glow rad="63500">
+                <a:schemeClr val="accent2">
+                  <a:satMod val="175000"/>
+                  <a:alpha val="25000"/>
+                </a:schemeClr>
+              </a:glow>
+            </a:effectLst>
+          </c:spPr>
+          <c:invertIfNegative val="0"/>
+          <c:dLbls>
+            <c:spPr>
+              <a:noFill/>
+              <a:ln>
+                <a:noFill/>
+              </a:ln>
+              <a:effectLst/>
+            </c:spPr>
+            <c:txPr>
+              <a:bodyPr rot="0" spcFirstLastPara="1" vertOverflow="ellipsis" vert="horz" wrap="square" lIns="38100" tIns="19050" rIns="38100" bIns="19050" anchor="ctr" anchorCtr="1">
+                <a:spAutoFit/>
+              </a:bodyPr>
+              <a:lstStyle/>
+              <a:p>
+                <a:pPr>
+                  <a:defRPr sz="1197" b="0" i="0" u="none" strike="noStrike" kern="1200" baseline="0">
+                    <a:solidFill>
+                      <a:schemeClr val="lt1">
+                        <a:lumMod val="75000"/>
+                      </a:schemeClr>
+                    </a:solidFill>
+                    <a:latin typeface="+mn-lt"/>
+                    <a:ea typeface="+mn-ea"/>
+                    <a:cs typeface="+mn-cs"/>
+                  </a:defRPr>
+                </a:pPr>
+                <a:endParaRPr lang="en-US"/>
+              </a:p>
+            </c:txPr>
+            <c:showLegendKey val="0"/>
+            <c:showVal val="1"/>
+            <c:showCatName val="0"/>
+            <c:showSerName val="0"/>
+            <c:showPercent val="0"/>
+            <c:showBubbleSize val="0"/>
+            <c:showLeaderLines val="0"/>
+            <c:extLst>
+              <c:ext xmlns:c15="http://schemas.microsoft.com/office/drawing/2012/chart" uri="{CE6537A1-D6FC-4f65-9D91-7224C49458BB}">
+                <c15:showLeaderLines val="1"/>
+                <c15:leaderLines>
+                  <c:spPr>
+                    <a:ln w="9525">
+                      <a:solidFill>
+                        <a:schemeClr val="lt1">
+                          <a:lumMod val="50000"/>
+                        </a:schemeClr>
+                      </a:solidFill>
+                      <a:round/>
+                    </a:ln>
+                    <a:effectLst/>
+                  </c:spPr>
+                </c15:leaderLines>
+              </c:ext>
+            </c:extLst>
+          </c:dLbls>
+          <c:cat>
+            <c:strRef>
+              <c:f>Sheet1!$A$2:$A$7</c:f>
+              <c:strCache>
+                <c:ptCount val="6"/>
+                <c:pt idx="0">
+                  <c:v>batch_size: 256, lr: 0.001, optimizer: Adam, image_size: 224x224</c:v>
+                </c:pt>
+                <c:pt idx="1">
+                  <c:v>batch_size: 256, lr: 0.0001, optimizer: Adam, image_size: 224x224</c:v>
+                </c:pt>
+                <c:pt idx="2">
+                  <c:v>batch_size: 256, lr: 0.0001, optimizer: SGD, image_size: 224x224</c:v>
+                </c:pt>
+                <c:pt idx="3">
+                  <c:v>batch_size: 64, lr: 0.001, optimizer: Adam, image_size: 224x224</c:v>
+                </c:pt>
+                <c:pt idx="4">
+                  <c:v>batch_size: 64, lr: 0.001, optimizer: Adam, image_size: 366x366</c:v>
+                </c:pt>
+                <c:pt idx="5">
+                  <c:v>batch_size: 64, lr: 0.0001, optimizer: Adam, image_size: 366x366</c:v>
+                </c:pt>
+              </c:strCache>
+            </c:strRef>
+          </c:cat>
+          <c:val>
+            <c:numRef>
+              <c:f>Sheet1!$C$2:$C$7</c:f>
+              <c:numCache>
+                <c:formatCode>General</c:formatCode>
+                <c:ptCount val="6"/>
+                <c:pt idx="0">
+                  <c:v>11.244</c:v>
+                </c:pt>
+                <c:pt idx="1">
+                  <c:v>11.348000000000001</c:v>
+                </c:pt>
+                <c:pt idx="2">
+                  <c:v>24.03</c:v>
+                </c:pt>
+                <c:pt idx="3">
+                  <c:v>11.381</c:v>
+                </c:pt>
+                <c:pt idx="4">
+                  <c:v>11.321999999999999</c:v>
+                </c:pt>
+                <c:pt idx="5">
+                  <c:v>11.551</c:v>
+                </c:pt>
+              </c:numCache>
+            </c:numRef>
+          </c:val>
+          <c:extLst>
+            <c:ext xmlns:c16="http://schemas.microsoft.com/office/drawing/2014/chart" uri="{C3380CC4-5D6E-409C-BE32-E72D297353CC}">
+              <c16:uniqueId val="{00000001-C3CF-4DDF-8C59-AEFE3C7B1CB1}"/>
+            </c:ext>
+          </c:extLst>
+        </c:ser>
+        <c:dLbls>
+          <c:showLegendKey val="0"/>
+          <c:showVal val="0"/>
+          <c:showCatName val="0"/>
+          <c:showSerName val="0"/>
+          <c:showPercent val="0"/>
+          <c:showBubbleSize val="0"/>
+        </c:dLbls>
+        <c:gapWidth val="315"/>
+        <c:overlap val="-40"/>
+        <c:axId val="206666824"/>
+        <c:axId val="206669776"/>
+      </c:barChart>
+      <c:catAx>
+        <c:axId val="206666824"/>
+        <c:scaling>
+          <c:orientation val="minMax"/>
+        </c:scaling>
+        <c:delete val="0"/>
+        <c:axPos val="b"/>
+        <c:majorGridlines>
+          <c:spPr>
+            <a:ln w="9525" cap="flat" cmpd="sng" algn="ctr">
+              <a:gradFill>
+                <a:gsLst>
+                  <a:gs pos="100000">
+                    <a:schemeClr val="dk1">
+                      <a:lumMod val="75000"/>
+                      <a:lumOff val="25000"/>
+                    </a:schemeClr>
+                  </a:gs>
+                  <a:gs pos="0">
+                    <a:schemeClr val="dk1">
+                      <a:lumMod val="65000"/>
+                      <a:lumOff val="35000"/>
+                    </a:schemeClr>
+                  </a:gs>
+                </a:gsLst>
+                <a:lin ang="5400000" scaled="0"/>
+              </a:gradFill>
+              <a:round/>
+            </a:ln>
+            <a:effectLst/>
+          </c:spPr>
+        </c:majorGridlines>
+        <c:numFmt formatCode="General" sourceLinked="1"/>
+        <c:majorTickMark val="none"/>
+        <c:minorTickMark val="none"/>
+        <c:tickLblPos val="nextTo"/>
+        <c:spPr>
+          <a:noFill/>
+          <a:ln>
+            <a:noFill/>
+          </a:ln>
+          <a:effectLst/>
+        </c:spPr>
+        <c:txPr>
+          <a:bodyPr rot="-60000000" spcFirstLastPara="1" vertOverflow="ellipsis" vert="horz" wrap="square" anchor="ctr" anchorCtr="1"/>
+          <a:lstStyle/>
+          <a:p>
+            <a:pPr>
+              <a:defRPr sz="1197" b="0" i="0" u="none" strike="noStrike" kern="1200" baseline="0">
+                <a:solidFill>
+                  <a:schemeClr val="lt1">
+                    <a:lumMod val="75000"/>
+                  </a:schemeClr>
+                </a:solidFill>
+                <a:latin typeface="+mn-lt"/>
+                <a:ea typeface="+mn-ea"/>
+                <a:cs typeface="+mn-cs"/>
+              </a:defRPr>
+            </a:pPr>
+            <a:endParaRPr lang="en-US"/>
+          </a:p>
+        </c:txPr>
+        <c:crossAx val="206669776"/>
+        <c:crosses val="autoZero"/>
+        <c:auto val="1"/>
+        <c:lblAlgn val="ctr"/>
+        <c:lblOffset val="100"/>
+        <c:noMultiLvlLbl val="0"/>
+      </c:catAx>
+      <c:valAx>
+        <c:axId val="206669776"/>
+        <c:scaling>
+          <c:orientation val="minMax"/>
+        </c:scaling>
+        <c:delete val="0"/>
+        <c:axPos val="l"/>
+        <c:majorGridlines>
+          <c:spPr>
+            <a:ln w="9525" cap="flat" cmpd="sng" algn="ctr">
+              <a:gradFill>
+                <a:gsLst>
+                  <a:gs pos="100000">
+                    <a:schemeClr val="dk1">
+                      <a:lumMod val="75000"/>
+                      <a:lumOff val="25000"/>
+                    </a:schemeClr>
+                  </a:gs>
+                  <a:gs pos="0">
+                    <a:schemeClr val="dk1">
+                      <a:lumMod val="65000"/>
+                      <a:lumOff val="35000"/>
+                    </a:schemeClr>
+                  </a:gs>
+                </a:gsLst>
+                <a:lin ang="5400000" scaled="0"/>
+              </a:gradFill>
+              <a:round/>
+            </a:ln>
+            <a:effectLst/>
+          </c:spPr>
+        </c:majorGridlines>
+        <c:numFmt formatCode="General" sourceLinked="1"/>
+        <c:majorTickMark val="none"/>
+        <c:minorTickMark val="none"/>
+        <c:tickLblPos val="nextTo"/>
+        <c:spPr>
+          <a:noFill/>
+          <a:ln>
+            <a:noFill/>
+          </a:ln>
+          <a:effectLst/>
+        </c:spPr>
+        <c:txPr>
+          <a:bodyPr rot="-60000000" spcFirstLastPara="1" vertOverflow="ellipsis" vert="horz" wrap="square" anchor="ctr" anchorCtr="1"/>
+          <a:lstStyle/>
+          <a:p>
+            <a:pPr>
+              <a:defRPr sz="1197" b="0" i="0" u="none" strike="noStrike" kern="1200" baseline="0">
+                <a:solidFill>
+                  <a:schemeClr val="lt1">
+                    <a:lumMod val="75000"/>
+                  </a:schemeClr>
+                </a:solidFill>
+                <a:latin typeface="+mn-lt"/>
+                <a:ea typeface="+mn-ea"/>
+                <a:cs typeface="+mn-cs"/>
+              </a:defRPr>
+            </a:pPr>
+            <a:endParaRPr lang="en-US"/>
+          </a:p>
+        </c:txPr>
+        <c:crossAx val="206666824"/>
+        <c:crosses val="autoZero"/>
+        <c:crossBetween val="between"/>
+      </c:valAx>
+      <c:spPr>
+        <a:noFill/>
+        <a:ln>
+          <a:noFill/>
+        </a:ln>
+        <a:effectLst/>
+      </c:spPr>
+    </c:plotArea>
+    <c:legend>
+      <c:legendPos val="t"/>
+      <c:overlay val="0"/>
+      <c:spPr>
+        <a:noFill/>
+        <a:ln>
+          <a:noFill/>
+        </a:ln>
+        <a:effectLst/>
+      </c:spPr>
+      <c:txPr>
+        <a:bodyPr rot="0" spcFirstLastPara="1" vertOverflow="ellipsis" vert="horz" wrap="square" anchor="ctr" anchorCtr="1"/>
+        <a:lstStyle/>
+        <a:p>
+          <a:pPr>
+            <a:defRPr sz="1197" b="0" i="0" u="none" strike="noStrike" kern="1200" baseline="0">
+              <a:solidFill>
+                <a:schemeClr val="lt1">
+                  <a:lumMod val="75000"/>
+                </a:schemeClr>
+              </a:solidFill>
+              <a:latin typeface="+mn-lt"/>
+              <a:ea typeface="+mn-ea"/>
+              <a:cs typeface="+mn-cs"/>
+            </a:defRPr>
+          </a:pPr>
+          <a:endParaRPr lang="en-US"/>
+        </a:p>
+      </c:txPr>
+    </c:legend>
+    <c:plotVisOnly val="1"/>
+    <c:dispBlanksAs val="gap"/>
+    <c:extLst>
+      <c:ext xmlns:c16r3="http://schemas.microsoft.com/office/drawing/2017/03/chart" uri="{56B9EC1D-385E-4148-901F-78D8002777C0}">
+        <c16r3:dataDisplayOptions16>
+          <c16r3:dispNaAsBlank val="1"/>
+        </c16r3:dataDisplayOptions16>
+      </c:ext>
+    </c:extLst>
+    <c:showDLblsOverMax val="0"/>
+  </c:chart>
+  <c:spPr>
+    <a:solidFill>
+      <a:schemeClr val="dk1">
+        <a:lumMod val="75000"/>
+        <a:lumOff val="25000"/>
+      </a:schemeClr>
+    </a:solidFill>
+    <a:ln w="9525" cap="flat" cmpd="sng" algn="ctr">
+      <a:solidFill>
+        <a:schemeClr val="dk1">
+          <a:lumMod val="15000"/>
+          <a:lumOff val="85000"/>
+        </a:schemeClr>
+      </a:solidFill>
+      <a:round/>
+    </a:ln>
+    <a:effectLst/>
+  </c:spPr>
+  <c:txPr>
+    <a:bodyPr/>
+    <a:lstStyle/>
+    <a:p>
+      <a:pPr>
+        <a:defRPr/>
+      </a:pPr>
+      <a:endParaRPr lang="en-US"/>
+    </a:p>
+  </c:txPr>
+  <c:externalData r:id="rId3">
+    <c:autoUpdate val="0"/>
+  </c:externalData>
+</c:chartSpace>
+</file>
+
+<file path=ppt/charts/colors1.xml><?xml version="1.0" encoding="utf-8"?>
+<cs:colorStyle xmlns:cs="http://schemas.microsoft.com/office/drawing/2012/chartStyle" xmlns:a="http://schemas.openxmlformats.org/drawingml/2006/main" meth="cycle" id="10">
+  <a:schemeClr val="accent1"/>
+  <a:schemeClr val="accent2"/>
+  <a:schemeClr val="accent3"/>
+  <a:schemeClr val="accent4"/>
+  <a:schemeClr val="accent5"/>
+  <a:schemeClr val="accent6"/>
+  <cs:variation/>
+  <cs:variation>
+    <a:lumMod val="60000"/>
+  </cs:variation>
+  <cs:variation>
+    <a:lumMod val="80000"/>
+    <a:lumOff val="20000"/>
+  </cs:variation>
+  <cs:variation>
+    <a:lumMod val="80000"/>
+  </cs:variation>
+  <cs:variation>
+    <a:lumMod val="60000"/>
+    <a:lumOff val="40000"/>
+  </cs:variation>
+  <cs:variation>
+    <a:lumMod val="50000"/>
+  </cs:variation>
+  <cs:variation>
+    <a:lumMod val="70000"/>
+    <a:lumOff val="30000"/>
+  </cs:variation>
+  <cs:variation>
+    <a:lumMod val="70000"/>
+  </cs:variation>
+  <cs:variation>
+    <a:lumMod val="50000"/>
+    <a:lumOff val="50000"/>
+  </cs:variation>
+</cs:colorStyle>
+</file>
+
+<file path=ppt/charts/style1.xml><?xml version="1.0" encoding="utf-8"?>
+<cs:chartStyle xmlns:cs="http://schemas.microsoft.com/office/drawing/2012/chartStyle" xmlns:a="http://schemas.openxmlformats.org/drawingml/2006/main" id="213">
+  <cs:axisTitle>
+    <cs:lnRef idx="0"/>
+    <cs:fillRef idx="0"/>
+    <cs:effectRef idx="0"/>
+    <cs:fontRef idx="minor">
+      <a:schemeClr val="lt1">
+        <a:lumMod val="75000"/>
+      </a:schemeClr>
+    </cs:fontRef>
+    <cs:defRPr sz="1197" b="1" kern="1200"/>
+  </cs:axisTitle>
+  <cs:categoryAxis>
+    <cs:lnRef idx="0"/>
+    <cs:fillRef idx="0"/>
+    <cs:effectRef idx="0"/>
+    <cs:fontRef idx="minor">
+      <a:schemeClr val="lt1">
+        <a:lumMod val="75000"/>
+      </a:schemeClr>
+    </cs:fontRef>
+    <cs:defRPr sz="1197" kern="1200"/>
+  </cs:categoryAxis>
+  <cs:chartArea>
+    <cs:lnRef idx="0"/>
+    <cs:fillRef idx="0"/>
+    <cs:effectRef idx="0"/>
+    <cs:fontRef idx="minor">
+      <a:schemeClr val="dk1"/>
+    </cs:fontRef>
+    <cs:spPr>
+      <a:solidFill>
+        <a:schemeClr val="dk1">
+          <a:lumMod val="75000"/>
+          <a:lumOff val="25000"/>
+        </a:schemeClr>
+      </a:solidFill>
+      <a:ln w="9525" cap="flat" cmpd="sng" algn="ctr">
+        <a:solidFill>
+          <a:schemeClr val="dk1">
+            <a:lumMod val="15000"/>
+            <a:lumOff val="85000"/>
+          </a:schemeClr>
+        </a:solidFill>
+        <a:round/>
+      </a:ln>
+    </cs:spPr>
+    <cs:defRPr sz="1197" kern="1200"/>
+  </cs:chartArea>
+  <cs:dataLabel>
+    <cs:lnRef idx="0"/>
+    <cs:fillRef idx="0"/>
+    <cs:effectRef idx="0"/>
+    <cs:fontRef idx="minor">
+      <a:schemeClr val="lt1">
+        <a:lumMod val="75000"/>
+      </a:schemeClr>
+    </cs:fontRef>
+    <cs:defRPr sz="1197" kern="1200"/>
+  </cs:dataLabel>
+  <cs:dataLabelCallout>
+    <cs:lnRef idx="0"/>
+    <cs:fillRef idx="0"/>
+    <cs:effectRef idx="0"/>
+    <cs:fontRef idx="minor">
+      <a:schemeClr val="lt1">
+        <a:lumMod val="15000"/>
+        <a:lumOff val="85000"/>
+      </a:schemeClr>
+    </cs:fontRef>
+    <cs:spPr>
+      <a:solidFill>
+        <a:schemeClr val="dk1">
+          <a:lumMod val="65000"/>
+          <a:lumOff val="35000"/>
+        </a:schemeClr>
+      </a:solidFill>
+    </cs:spPr>
+    <cs:defRPr sz="1197" kern="1200"/>
+    <cs:bodyPr rot="0" spcFirstLastPara="1" vertOverflow="clip" horzOverflow="clip" vert="horz" wrap="square" lIns="36576" tIns="18288" rIns="36576" bIns="18288" anchor="ctr" anchorCtr="1">
+      <a:spAutoFit/>
+    </cs:bodyPr>
+  </cs:dataLabelCallout>
+  <cs:dataPoint>
+    <cs:lnRef idx="0">
+      <cs:styleClr val="auto"/>
+    </cs:lnRef>
+    <cs:fillRef idx="0"/>
+    <cs:effectRef idx="0">
+      <cs:styleClr val="auto"/>
+    </cs:effectRef>
+    <cs:fontRef idx="minor">
+      <a:schemeClr val="dk1"/>
+    </cs:fontRef>
+    <cs:spPr>
+      <a:ln w="9525" cap="flat" cmpd="sng" algn="ctr">
+        <a:solidFill>
+          <a:schemeClr val="phClr"/>
+        </a:solidFill>
+        <a:miter lim="800000"/>
+      </a:ln>
+      <a:effectLst>
+        <a:glow rad="63500">
+          <a:schemeClr val="phClr">
+            <a:satMod val="175000"/>
+            <a:alpha val="25000"/>
+          </a:schemeClr>
+        </a:glow>
+      </a:effectLst>
+    </cs:spPr>
+  </cs:dataPoint>
+  <cs:dataPoint3D>
+    <cs:lnRef idx="0">
+      <cs:styleClr val="auto"/>
+    </cs:lnRef>
+    <cs:fillRef idx="0">
+      <cs:styleClr val="auto"/>
+    </cs:fillRef>
+    <cs:effectRef idx="0">
+      <cs:styleClr val="auto"/>
+    </cs:effectRef>
+    <cs:fontRef idx="minor">
+      <a:schemeClr val="dk1"/>
+    </cs:fontRef>
+    <cs:spPr>
+      <a:ln w="9525" cap="flat" cmpd="sng" algn="ctr">
+        <a:solidFill>
+          <a:schemeClr val="phClr"/>
+        </a:solidFill>
+        <a:miter lim="800000"/>
+      </a:ln>
+      <a:effectLst>
+        <a:glow rad="63500">
+          <a:schemeClr val="phClr">
+            <a:satMod val="175000"/>
+            <a:alpha val="25000"/>
+          </a:schemeClr>
+        </a:glow>
+      </a:effectLst>
+    </cs:spPr>
+  </cs:dataPoint3D>
+  <cs:dataPointLine>
+    <cs:lnRef idx="0">
+      <cs:styleClr val="auto"/>
+    </cs:lnRef>
+    <cs:fillRef idx="0">
+      <cs:styleClr val="auto"/>
+    </cs:fillRef>
+    <cs:effectRef idx="0">
+      <cs:styleClr val="auto"/>
+    </cs:effectRef>
+    <cs:fontRef idx="minor">
+      <a:schemeClr val="dk1"/>
+    </cs:fontRef>
+    <cs:spPr>
+      <a:ln w="22225" cap="rnd">
+        <a:solidFill>
+          <a:schemeClr val="phClr"/>
+        </a:solidFill>
+      </a:ln>
+      <a:effectLst>
+        <a:glow rad="139700">
+          <a:schemeClr val="phClr">
+            <a:satMod val="175000"/>
+            <a:alpha val="14000"/>
+          </a:schemeClr>
+        </a:glow>
+      </a:effectLst>
+    </cs:spPr>
+  </cs:dataPointLine>
+  <cs:dataPointMarker>
+    <cs:lnRef idx="0">
+      <cs:styleClr val="auto"/>
+    </cs:lnRef>
+    <cs:fillRef idx="0">
+      <cs:styleClr val="auto"/>
+    </cs:fillRef>
+    <cs:effectRef idx="0">
+      <cs:styleClr val="auto"/>
+    </cs:effectRef>
+    <cs:fontRef idx="minor">
+      <a:schemeClr val="dk1"/>
+    </cs:fontRef>
+    <cs:spPr>
+      <a:solidFill>
+        <a:schemeClr val="phClr">
+          <a:lumMod val="60000"/>
+          <a:lumOff val="40000"/>
+        </a:schemeClr>
+      </a:solidFill>
+      <a:effectLst>
+        <a:glow rad="63500">
+          <a:schemeClr val="phClr">
+            <a:satMod val="175000"/>
+            <a:alpha val="25000"/>
+          </a:schemeClr>
+        </a:glow>
+      </a:effectLst>
+    </cs:spPr>
+  </cs:dataPointMarker>
+  <cs:dataPointMarkerLayout symbol="circle" size="4"/>
+  <cs:dataPointWireframe>
+    <cs:lnRef idx="0">
+      <cs:styleClr val="auto"/>
+    </cs:lnRef>
+    <cs:fillRef idx="0"/>
+    <cs:effectRef idx="0"/>
+    <cs:fontRef idx="minor">
+      <a:schemeClr val="dk1"/>
+    </cs:fontRef>
+    <cs:spPr>
+      <a:ln w="9525" cap="rnd">
+        <a:solidFill>
+          <a:schemeClr val="phClr"/>
+        </a:solidFill>
+        <a:round/>
+      </a:ln>
+    </cs:spPr>
+  </cs:dataPointWireframe>
+  <cs:dataTable>
+    <cs:lnRef idx="0"/>
+    <cs:fillRef idx="0"/>
+    <cs:effectRef idx="0"/>
+    <cs:fontRef idx="minor">
+      <a:schemeClr val="lt1">
+        <a:lumMod val="75000"/>
+      </a:schemeClr>
+    </cs:fontRef>
+    <cs:spPr>
+      <a:ln w="9525">
+        <a:solidFill>
+          <a:schemeClr val="dk1">
+            <a:lumMod val="50000"/>
+            <a:lumOff val="50000"/>
+          </a:schemeClr>
+        </a:solidFill>
+      </a:ln>
+    </cs:spPr>
+    <cs:defRPr sz="1197" kern="1200"/>
+  </cs:dataTable>
+  <cs:downBar>
+    <cs:lnRef idx="0"/>
+    <cs:fillRef idx="0"/>
+    <cs:effectRef idx="0"/>
+    <cs:fontRef idx="minor">
+      <a:schemeClr val="lt1"/>
+    </cs:fontRef>
+    <cs:spPr>
+      <a:solidFill>
+        <a:schemeClr val="dk1">
+          <a:lumMod val="50000"/>
+          <a:lumOff val="50000"/>
+        </a:schemeClr>
+      </a:solidFill>
+      <a:ln w="9525">
+        <a:solidFill>
+          <a:schemeClr val="dk1">
+            <a:lumMod val="75000"/>
+          </a:schemeClr>
+        </a:solidFill>
+        <a:round/>
+      </a:ln>
+    </cs:spPr>
+  </cs:downBar>
+  <cs:dropLine>
+    <cs:lnRef idx="0"/>
+    <cs:fillRef idx="0"/>
+    <cs:effectRef idx="0"/>
+    <cs:fontRef idx="minor">
+      <a:schemeClr val="dk1"/>
+    </cs:fontRef>
+    <cs:spPr>
+      <a:ln w="9525">
+        <a:solidFill>
+          <a:schemeClr val="lt1">
+            <a:lumMod val="50000"/>
+          </a:schemeClr>
+        </a:solidFill>
+        <a:round/>
+      </a:ln>
+    </cs:spPr>
+  </cs:dropLine>
+  <cs:errorBar>
+    <cs:lnRef idx="0"/>
+    <cs:fillRef idx="0"/>
+    <cs:effectRef idx="0"/>
+    <cs:fontRef idx="minor">
+      <a:schemeClr val="dk1"/>
+    </cs:fontRef>
+    <cs:spPr>
+      <a:ln w="9525">
+        <a:solidFill>
+          <a:schemeClr val="lt1">
+            <a:lumMod val="50000"/>
+          </a:schemeClr>
+        </a:solidFill>
+        <a:round/>
+      </a:ln>
+    </cs:spPr>
+  </cs:errorBar>
+  <cs:floor>
+    <cs:lnRef idx="0"/>
+    <cs:fillRef idx="0"/>
+    <cs:effectRef idx="0"/>
+    <cs:fontRef idx="minor">
+      <a:schemeClr val="dk1"/>
+    </cs:fontRef>
+  </cs:floor>
+  <cs:gridlineMajor>
+    <cs:lnRef idx="0"/>
+    <cs:fillRef idx="0"/>
+    <cs:effectRef idx="0"/>
+    <cs:fontRef idx="minor">
+      <a:schemeClr val="dk1"/>
+    </cs:fontRef>
+    <cs:spPr>
+      <a:ln w="9525" cap="flat" cmpd="sng" algn="ctr">
+        <a:gradFill>
+          <a:gsLst>
+            <a:gs pos="100000">
+              <a:schemeClr val="dk1">
+                <a:lumMod val="75000"/>
+                <a:lumOff val="25000"/>
+              </a:schemeClr>
+            </a:gs>
+            <a:gs pos="0">
+              <a:schemeClr val="dk1">
+                <a:lumMod val="65000"/>
+                <a:lumOff val="35000"/>
+              </a:schemeClr>
+            </a:gs>
+          </a:gsLst>
+          <a:lin ang="5400000" scaled="0"/>
+        </a:gradFill>
+        <a:round/>
+      </a:ln>
+    </cs:spPr>
+  </cs:gridlineMajor>
+  <cs:gridlineMinor>
+    <cs:lnRef idx="0"/>
+    <cs:fillRef idx="0"/>
+    <cs:effectRef idx="0"/>
+    <cs:fontRef idx="minor">
+      <a:schemeClr val="dk1"/>
+    </cs:fontRef>
+    <cs:spPr>
+      <a:ln w="9525" cap="flat" cmpd="sng" algn="ctr">
+        <a:gradFill>
+          <a:gsLst>
+            <a:gs pos="100000">
+              <a:schemeClr val="dk1">
+                <a:lumMod val="75000"/>
+                <a:lumOff val="25000"/>
+                <a:alpha val="25000"/>
+              </a:schemeClr>
+            </a:gs>
+            <a:gs pos="0">
+              <a:schemeClr val="dk1">
+                <a:lumMod val="65000"/>
+                <a:lumOff val="35000"/>
+                <a:alpha val="25000"/>
+              </a:schemeClr>
+            </a:gs>
+          </a:gsLst>
+          <a:lin ang="5400000" scaled="0"/>
+        </a:gradFill>
+        <a:round/>
+      </a:ln>
+    </cs:spPr>
+  </cs:gridlineMinor>
+  <cs:hiLoLine>
+    <cs:lnRef idx="0"/>
+    <cs:fillRef idx="0"/>
+    <cs:effectRef idx="0"/>
+    <cs:fontRef idx="minor">
+      <a:schemeClr val="dk1"/>
+    </cs:fontRef>
+    <cs:spPr>
+      <a:ln w="9525">
+        <a:solidFill>
+          <a:schemeClr val="lt1">
+            <a:lumMod val="50000"/>
+          </a:schemeClr>
+        </a:solidFill>
+        <a:round/>
+      </a:ln>
+    </cs:spPr>
+  </cs:hiLoLine>
+  <cs:leaderLine>
+    <cs:lnRef idx="0"/>
+    <cs:fillRef idx="0"/>
+    <cs:effectRef idx="0"/>
+    <cs:fontRef idx="minor">
+      <a:schemeClr val="dk1"/>
+    </cs:fontRef>
+    <cs:spPr>
+      <a:ln w="9525">
+        <a:solidFill>
+          <a:schemeClr val="lt1">
+            <a:lumMod val="50000"/>
+          </a:schemeClr>
+        </a:solidFill>
+        <a:round/>
+      </a:ln>
+    </cs:spPr>
+  </cs:leaderLine>
+  <cs:legend>
+    <cs:lnRef idx="0"/>
+    <cs:fillRef idx="0"/>
+    <cs:effectRef idx="0"/>
+    <cs:fontRef idx="minor">
+      <a:schemeClr val="lt1">
+        <a:lumMod val="75000"/>
+      </a:schemeClr>
+    </cs:fontRef>
+    <cs:defRPr sz="1197" kern="1200"/>
+  </cs:legend>
+  <cs:plotArea>
+    <cs:lnRef idx="0"/>
+    <cs:fillRef idx="0"/>
+    <cs:effectRef idx="0"/>
+    <cs:fontRef idx="minor">
+      <a:schemeClr val="dk1"/>
+    </cs:fontRef>
+  </cs:plotArea>
+  <cs:plotArea3D>
+    <cs:lnRef idx="0"/>
+    <cs:fillRef idx="0"/>
+    <cs:effectRef idx="0"/>
+    <cs:fontRef idx="minor">
+      <a:schemeClr val="dk1"/>
+    </cs:fontRef>
+  </cs:plotArea3D>
+  <cs:seriesAxis>
+    <cs:lnRef idx="0"/>
+    <cs:fillRef idx="0"/>
+    <cs:effectRef idx="0"/>
+    <cs:fontRef idx="minor">
+      <a:schemeClr val="lt1">
+        <a:lumMod val="75000"/>
+      </a:schemeClr>
+    </cs:fontRef>
+    <cs:defRPr sz="1197" kern="1200"/>
+  </cs:seriesAxis>
+  <cs:seriesLine>
+    <cs:lnRef idx="0"/>
+    <cs:fillRef idx="0"/>
+    <cs:effectRef idx="0"/>
+    <cs:fontRef idx="minor">
+      <a:schemeClr val="dk1"/>
+    </cs:fontRef>
+    <cs:spPr>
+      <a:ln w="9525">
+        <a:solidFill>
+          <a:schemeClr val="lt1">
+            <a:lumMod val="50000"/>
+          </a:schemeClr>
+        </a:solidFill>
+        <a:round/>
+      </a:ln>
+    </cs:spPr>
+  </cs:seriesLine>
+  <cs:title>
+    <cs:lnRef idx="0"/>
+    <cs:fillRef idx="0"/>
+    <cs:effectRef idx="0"/>
+    <cs:fontRef idx="minor">
+      <a:schemeClr val="lt1">
+        <a:lumMod val="85000"/>
+      </a:schemeClr>
+    </cs:fontRef>
+    <cs:defRPr sz="1862" b="1" kern="1200" cap="none" baseline="0"/>
+  </cs:title>
+  <cs:trendline>
+    <cs:lnRef idx="0">
+      <cs:styleClr val="auto"/>
+    </cs:lnRef>
+    <cs:fillRef idx="0"/>
+    <cs:effectRef idx="0"/>
+    <cs:fontRef idx="minor">
+      <a:schemeClr val="lt1"/>
+    </cs:fontRef>
+    <cs:spPr>
+      <a:ln w="25400" cap="rnd">
+        <a:solidFill>
+          <a:schemeClr val="phClr">
+            <a:alpha val="50000"/>
+          </a:schemeClr>
+        </a:solidFill>
+      </a:ln>
+    </cs:spPr>
+  </cs:trendline>
+  <cs:trendlineLabel>
+    <cs:lnRef idx="0"/>
+    <cs:fillRef idx="0"/>
+    <cs:effectRef idx="0"/>
+    <cs:fontRef idx="minor">
+      <a:schemeClr val="lt1">
+        <a:lumMod val="75000"/>
+      </a:schemeClr>
+    </cs:fontRef>
+    <cs:defRPr sz="1197" kern="1200"/>
+  </cs:trendlineLabel>
+  <cs:upBar>
+    <cs:lnRef idx="0"/>
+    <cs:fillRef idx="0"/>
+    <cs:effectRef idx="0"/>
+    <cs:fontRef idx="minor">
+      <a:schemeClr val="dk1"/>
+    </cs:fontRef>
+    <cs:spPr>
+      <a:solidFill>
+        <a:schemeClr val="lt1">
+          <a:lumMod val="85000"/>
+        </a:schemeClr>
+      </a:solidFill>
+      <a:ln w="9525">
+        <a:solidFill>
+          <a:schemeClr val="dk1">
+            <a:lumMod val="50000"/>
+          </a:schemeClr>
+        </a:solidFill>
+        <a:round/>
+      </a:ln>
+    </cs:spPr>
+  </cs:upBar>
+  <cs:valueAxis>
+    <cs:lnRef idx="0"/>
+    <cs:fillRef idx="0"/>
+    <cs:effectRef idx="0"/>
+    <cs:fontRef idx="minor">
+      <a:schemeClr val="lt1">
+        <a:lumMod val="75000"/>
+      </a:schemeClr>
+    </cs:fontRef>
+    <cs:defRPr sz="1197" kern="1200"/>
+  </cs:valueAxis>
+  <cs:wall>
+    <cs:lnRef idx="0"/>
+    <cs:fillRef idx="0"/>
+    <cs:effectRef idx="0"/>
+    <cs:fontRef idx="minor">
+      <a:schemeClr val="dk1"/>
+    </cs:fontRef>
+  </cs:wall>
+</cs:chartStyle>
 </file>
 
 <file path=ppt/handoutMasters/handoutMaster1.xml><?xml version="1.0" encoding="utf-8"?>
@@ -25955,10 +27119,10 @@
       </p:grpSpPr>
       <p:sp>
         <p:nvSpPr>
-          <p:cNvPr id="5" name="Title 4">
+          <p:cNvPr id="2" name="Title 1">
             <a:extLst>
               <a:ext uri="{FF2B5EF4-FFF2-40B4-BE49-F238E27FC236}">
-                <a16:creationId xmlns:a16="http://schemas.microsoft.com/office/drawing/2014/main" id="{201323FB-427E-4A8D-B473-AB0657D8D23B}"/>
+                <a16:creationId xmlns:a16="http://schemas.microsoft.com/office/drawing/2014/main" id="{4F237B7A-DBF7-497D-B67F-9961C27872E8}"/>
               </a:ext>
             </a:extLst>
           </p:cNvPr>
@@ -25975,1823 +27139,18 @@
           <a:lstStyle/>
           <a:p>
             <a:r>
-              <a:rPr lang="en-US" dirty="0"/>
-              <a:t>Hyper parameter tuning of baseline model</a:t>
+              <a:rPr lang="en-IN" dirty="0"/>
+              <a:t>Hyperparameter Tuning Results</a:t>
             </a:r>
           </a:p>
         </p:txBody>
       </p:sp>
-      <p:graphicFrame>
-        <p:nvGraphicFramePr>
-          <p:cNvPr id="6" name="Table 5">
+      <p:sp>
+        <p:nvSpPr>
+          <p:cNvPr id="3" name="Slide Number Placeholder 2">
             <a:extLst>
               <a:ext uri="{FF2B5EF4-FFF2-40B4-BE49-F238E27FC236}">
-                <a16:creationId xmlns:a16="http://schemas.microsoft.com/office/drawing/2014/main" id="{E8EEB296-8554-4D20-B3B8-C0BBC380A58D}"/>
-              </a:ext>
-            </a:extLst>
-          </p:cNvPr>
-          <p:cNvGraphicFramePr>
-            <a:graphicFrameLocks noGrp="1"/>
-          </p:cNvGraphicFramePr>
-          <p:nvPr>
-            <p:extLst>
-              <p:ext uri="{D42A27DB-BD31-4B8C-83A1-F6EECF244321}">
-                <p14:modId xmlns:p14="http://schemas.microsoft.com/office/powerpoint/2010/main" val="4034905456"/>
-              </p:ext>
-            </p:extLst>
-          </p:nvPr>
-        </p:nvGraphicFramePr>
-        <p:xfrm>
-          <a:off x="1130300" y="1856740"/>
-          <a:ext cx="9931400" cy="3931920"/>
-        </p:xfrm>
-        <a:graphic>
-          <a:graphicData uri="http://schemas.openxmlformats.org/drawingml/2006/table">
-            <a:tbl>
-              <a:tblPr firstRow="1" bandRow="1">
-                <a:tableStyleId>{5C22544A-7EE6-4342-B048-85BDC9FD1C3A}</a:tableStyleId>
-              </a:tblPr>
-              <a:tblGrid>
-                <a:gridCol w="2482850">
-                  <a:extLst>
-                    <a:ext uri="{9D8B030D-6E8A-4147-A177-3AD203B41FA5}">
-                      <a16:colId xmlns:a16="http://schemas.microsoft.com/office/drawing/2014/main" val="3559833401"/>
-                    </a:ext>
-                  </a:extLst>
-                </a:gridCol>
-                <a:gridCol w="2482850">
-                  <a:extLst>
-                    <a:ext uri="{9D8B030D-6E8A-4147-A177-3AD203B41FA5}">
-                      <a16:colId xmlns:a16="http://schemas.microsoft.com/office/drawing/2014/main" val="82523989"/>
-                    </a:ext>
-                  </a:extLst>
-                </a:gridCol>
-                <a:gridCol w="2482850">
-                  <a:extLst>
-                    <a:ext uri="{9D8B030D-6E8A-4147-A177-3AD203B41FA5}">
-                      <a16:colId xmlns:a16="http://schemas.microsoft.com/office/drawing/2014/main" val="3211310719"/>
-                    </a:ext>
-                  </a:extLst>
-                </a:gridCol>
-                <a:gridCol w="2482850">
-                  <a:extLst>
-                    <a:ext uri="{9D8B030D-6E8A-4147-A177-3AD203B41FA5}">
-                      <a16:colId xmlns:a16="http://schemas.microsoft.com/office/drawing/2014/main" val="4160613981"/>
-                    </a:ext>
-                  </a:extLst>
-                </a:gridCol>
-              </a:tblGrid>
-              <a:tr h="640080">
-                <a:tc>
-                  <a:txBody>
-                    <a:bodyPr/>
-                    <a:lstStyle/>
-                    <a:p>
-                      <a:pPr algn="ctr"/>
-                      <a:r>
-                        <a:rPr lang="en-GB" sz="1600" b="0" dirty="0">
-                          <a:latin typeface="+mn-lt"/>
-                          <a:cs typeface="Arial" panose="020B0604020202020204" pitchFamily="34" charset="0"/>
-                        </a:rPr>
-                        <a:t>Model</a:t>
-                      </a:r>
-                    </a:p>
-                  </a:txBody>
-                  <a:tcPr anchor="ctr">
-                    <a:lnL w="12700" cap="flat" cmpd="sng" algn="ctr">
-                      <a:noFill/>
-                      <a:prstDash val="solid"/>
-                      <a:round/>
-                      <a:headEnd type="none" w="med" len="med"/>
-                      <a:tailEnd type="none" w="med" len="med"/>
-                    </a:lnL>
-                    <a:lnR w="12700" cap="flat" cmpd="sng" algn="ctr">
-                      <a:solidFill>
-                        <a:schemeClr val="accent2">
-                          <a:lumMod val="75000"/>
-                        </a:schemeClr>
-                      </a:solidFill>
-                      <a:prstDash val="solid"/>
-                      <a:round/>
-                      <a:headEnd type="none" w="med" len="med"/>
-                      <a:tailEnd type="none" w="med" len="med"/>
-                    </a:lnR>
-                    <a:lnT w="38100" cap="flat" cmpd="sng" algn="ctr">
-                      <a:solidFill>
-                        <a:schemeClr val="accent2">
-                          <a:lumMod val="75000"/>
-                        </a:schemeClr>
-                      </a:solidFill>
-                      <a:prstDash val="solid"/>
-                      <a:round/>
-                      <a:headEnd type="none" w="med" len="med"/>
-                      <a:tailEnd type="none" w="med" len="med"/>
-                    </a:lnT>
-                    <a:lnB w="38100" cap="flat" cmpd="sng" algn="ctr">
-                      <a:solidFill>
-                        <a:schemeClr val="accent2">
-                          <a:lumMod val="75000"/>
-                        </a:schemeClr>
-                      </a:solidFill>
-                      <a:prstDash val="solid"/>
-                      <a:round/>
-                      <a:headEnd type="none" w="med" len="med"/>
-                      <a:tailEnd type="none" w="med" len="med"/>
-                    </a:lnB>
-                    <a:lnTlToBr w="12700" cmpd="sng">
-                      <a:noFill/>
-                      <a:prstDash val="solid"/>
-                    </a:lnTlToBr>
-                    <a:lnBlToTr w="12700" cmpd="sng">
-                      <a:noFill/>
-                      <a:prstDash val="solid"/>
-                    </a:lnBlToTr>
-                    <a:noFill/>
-                  </a:tcPr>
-                </a:tc>
-                <a:tc>
-                  <a:txBody>
-                    <a:bodyPr/>
-                    <a:lstStyle/>
-                    <a:p>
-                      <a:pPr marL="0" marR="0" lvl="0" indent="0" algn="ctr" defTabSz="914400" rtl="0" eaLnBrk="1" fontAlgn="auto" latinLnBrk="0" hangingPunct="1">
-                        <a:lnSpc>
-                          <a:spcPct val="100000"/>
-                        </a:lnSpc>
-                        <a:spcBef>
-                          <a:spcPts val="0"/>
-                        </a:spcBef>
-                        <a:spcAft>
-                          <a:spcPts val="0"/>
-                        </a:spcAft>
-                        <a:buClrTx/>
-                        <a:buSzTx/>
-                        <a:buFontTx/>
-                        <a:buNone/>
-                        <a:tabLst/>
-                        <a:defRPr/>
-                      </a:pPr>
-                      <a:r>
-                        <a:rPr lang="en-GB" sz="1600" b="0" dirty="0">
-                          <a:latin typeface="+mn-lt"/>
-                          <a:cs typeface="Arial" panose="020B0604020202020204" pitchFamily="34" charset="0"/>
-                        </a:rPr>
-                        <a:t>Learning Rate</a:t>
-                      </a:r>
-                    </a:p>
-                  </a:txBody>
-                  <a:tcPr anchor="ctr">
-                    <a:lnL w="12700" cap="flat" cmpd="sng" algn="ctr">
-                      <a:solidFill>
-                        <a:schemeClr val="accent2">
-                          <a:lumMod val="75000"/>
-                        </a:schemeClr>
-                      </a:solidFill>
-                      <a:prstDash val="solid"/>
-                      <a:round/>
-                      <a:headEnd type="none" w="med" len="med"/>
-                      <a:tailEnd type="none" w="med" len="med"/>
-                    </a:lnL>
-                    <a:lnR w="12700" cap="flat" cmpd="sng" algn="ctr">
-                      <a:solidFill>
-                        <a:schemeClr val="accent2">
-                          <a:lumMod val="75000"/>
-                        </a:schemeClr>
-                      </a:solidFill>
-                      <a:prstDash val="solid"/>
-                      <a:round/>
-                      <a:headEnd type="none" w="med" len="med"/>
-                      <a:tailEnd type="none" w="med" len="med"/>
-                    </a:lnR>
-                    <a:lnT w="38100" cap="flat" cmpd="sng" algn="ctr">
-                      <a:solidFill>
-                        <a:schemeClr val="accent2">
-                          <a:lumMod val="75000"/>
-                        </a:schemeClr>
-                      </a:solidFill>
-                      <a:prstDash val="solid"/>
-                      <a:round/>
-                      <a:headEnd type="none" w="med" len="med"/>
-                      <a:tailEnd type="none" w="med" len="med"/>
-                    </a:lnT>
-                    <a:lnB w="38100" cap="flat" cmpd="sng" algn="ctr">
-                      <a:solidFill>
-                        <a:schemeClr val="accent2">
-                          <a:lumMod val="75000"/>
-                        </a:schemeClr>
-                      </a:solidFill>
-                      <a:prstDash val="solid"/>
-                      <a:round/>
-                      <a:headEnd type="none" w="med" len="med"/>
-                      <a:tailEnd type="none" w="med" len="med"/>
-                    </a:lnB>
-                    <a:lnTlToBr w="12700" cmpd="sng">
-                      <a:noFill/>
-                      <a:prstDash val="solid"/>
-                    </a:lnTlToBr>
-                    <a:lnBlToTr w="12700" cmpd="sng">
-                      <a:noFill/>
-                      <a:prstDash val="solid"/>
-                    </a:lnBlToTr>
-                    <a:noFill/>
-                  </a:tcPr>
-                </a:tc>
-                <a:tc>
-                  <a:txBody>
-                    <a:bodyPr/>
-                    <a:lstStyle/>
-                    <a:p>
-                      <a:pPr marL="0" marR="0" lvl="0" indent="0" algn="ctr" defTabSz="914400" rtl="0" eaLnBrk="1" fontAlgn="auto" latinLnBrk="0" hangingPunct="1">
-                        <a:lnSpc>
-                          <a:spcPct val="100000"/>
-                        </a:lnSpc>
-                        <a:spcBef>
-                          <a:spcPts val="0"/>
-                        </a:spcBef>
-                        <a:spcAft>
-                          <a:spcPts val="0"/>
-                        </a:spcAft>
-                        <a:buClrTx/>
-                        <a:buSzTx/>
-                        <a:buFontTx/>
-                        <a:buNone/>
-                        <a:tabLst/>
-                        <a:defRPr/>
-                      </a:pPr>
-                      <a:r>
-                        <a:rPr lang="en-GB" sz="1600" b="0" dirty="0">
-                          <a:latin typeface="+mn-lt"/>
-                          <a:cs typeface="Arial" panose="020B0604020202020204" pitchFamily="34" charset="0"/>
-                        </a:rPr>
-                        <a:t>Optimizer</a:t>
-                      </a:r>
-                    </a:p>
-                  </a:txBody>
-                  <a:tcPr anchor="ctr">
-                    <a:lnL w="12700" cap="flat" cmpd="sng" algn="ctr">
-                      <a:solidFill>
-                        <a:schemeClr val="accent2">
-                          <a:lumMod val="75000"/>
-                        </a:schemeClr>
-                      </a:solidFill>
-                      <a:prstDash val="solid"/>
-                      <a:round/>
-                      <a:headEnd type="none" w="med" len="med"/>
-                      <a:tailEnd type="none" w="med" len="med"/>
-                    </a:lnL>
-                    <a:lnR w="12700" cap="flat" cmpd="sng" algn="ctr">
-                      <a:solidFill>
-                        <a:schemeClr val="accent2">
-                          <a:lumMod val="75000"/>
-                        </a:schemeClr>
-                      </a:solidFill>
-                      <a:prstDash val="solid"/>
-                      <a:round/>
-                      <a:headEnd type="none" w="med" len="med"/>
-                      <a:tailEnd type="none" w="med" len="med"/>
-                    </a:lnR>
-                    <a:lnT w="38100" cap="flat" cmpd="sng" algn="ctr">
-                      <a:solidFill>
-                        <a:schemeClr val="accent2">
-                          <a:lumMod val="75000"/>
-                        </a:schemeClr>
-                      </a:solidFill>
-                      <a:prstDash val="solid"/>
-                      <a:round/>
-                      <a:headEnd type="none" w="med" len="med"/>
-                      <a:tailEnd type="none" w="med" len="med"/>
-                    </a:lnT>
-                    <a:lnB w="38100" cap="flat" cmpd="sng" algn="ctr">
-                      <a:solidFill>
-                        <a:schemeClr val="accent2">
-                          <a:lumMod val="75000"/>
-                        </a:schemeClr>
-                      </a:solidFill>
-                      <a:prstDash val="solid"/>
-                      <a:round/>
-                      <a:headEnd type="none" w="med" len="med"/>
-                      <a:tailEnd type="none" w="med" len="med"/>
-                    </a:lnB>
-                    <a:lnTlToBr w="12700" cmpd="sng">
-                      <a:noFill/>
-                      <a:prstDash val="solid"/>
-                    </a:lnTlToBr>
-                    <a:lnBlToTr w="12700" cmpd="sng">
-                      <a:noFill/>
-                      <a:prstDash val="solid"/>
-                    </a:lnBlToTr>
-                    <a:noFill/>
-                  </a:tcPr>
-                </a:tc>
-                <a:tc>
-                  <a:txBody>
-                    <a:bodyPr/>
-                    <a:lstStyle/>
-                    <a:p>
-                      <a:pPr marL="0" marR="0" lvl="0" indent="0" algn="ctr" defTabSz="914400" rtl="0" eaLnBrk="1" fontAlgn="auto" latinLnBrk="0" hangingPunct="1">
-                        <a:lnSpc>
-                          <a:spcPct val="100000"/>
-                        </a:lnSpc>
-                        <a:spcBef>
-                          <a:spcPts val="0"/>
-                        </a:spcBef>
-                        <a:spcAft>
-                          <a:spcPts val="0"/>
-                        </a:spcAft>
-                        <a:buClrTx/>
-                        <a:buSzTx/>
-                        <a:buFontTx/>
-                        <a:buNone/>
-                        <a:tabLst/>
-                        <a:defRPr/>
-                      </a:pPr>
-                      <a:r>
-                        <a:rPr lang="en-GB" sz="1600" b="0" dirty="0">
-                          <a:latin typeface="+mn-lt"/>
-                          <a:cs typeface="Arial" panose="020B0604020202020204" pitchFamily="34" charset="0"/>
-                        </a:rPr>
-                        <a:t>Test RMSE</a:t>
-                      </a:r>
-                    </a:p>
-                  </a:txBody>
-                  <a:tcPr anchor="ctr">
-                    <a:lnL w="12700" cap="flat" cmpd="sng" algn="ctr">
-                      <a:solidFill>
-                        <a:schemeClr val="accent2">
-                          <a:lumMod val="75000"/>
-                        </a:schemeClr>
-                      </a:solidFill>
-                      <a:prstDash val="solid"/>
-                      <a:round/>
-                      <a:headEnd type="none" w="med" len="med"/>
-                      <a:tailEnd type="none" w="med" len="med"/>
-                    </a:lnL>
-                    <a:lnR w="12700" cap="flat" cmpd="sng" algn="ctr">
-                      <a:noFill/>
-                      <a:prstDash val="solid"/>
-                      <a:round/>
-                      <a:headEnd type="none" w="med" len="med"/>
-                      <a:tailEnd type="none" w="med" len="med"/>
-                    </a:lnR>
-                    <a:lnT w="38100" cap="flat" cmpd="sng" algn="ctr">
-                      <a:solidFill>
-                        <a:schemeClr val="accent2">
-                          <a:lumMod val="75000"/>
-                        </a:schemeClr>
-                      </a:solidFill>
-                      <a:prstDash val="solid"/>
-                      <a:round/>
-                      <a:headEnd type="none" w="med" len="med"/>
-                      <a:tailEnd type="none" w="med" len="med"/>
-                    </a:lnT>
-                    <a:lnB w="38100" cap="flat" cmpd="sng" algn="ctr">
-                      <a:solidFill>
-                        <a:schemeClr val="accent2">
-                          <a:lumMod val="75000"/>
-                        </a:schemeClr>
-                      </a:solidFill>
-                      <a:prstDash val="solid"/>
-                      <a:round/>
-                      <a:headEnd type="none" w="med" len="med"/>
-                      <a:tailEnd type="none" w="med" len="med"/>
-                    </a:lnB>
-                    <a:lnTlToBr w="12700" cmpd="sng">
-                      <a:noFill/>
-                      <a:prstDash val="solid"/>
-                    </a:lnTlToBr>
-                    <a:lnBlToTr w="12700" cmpd="sng">
-                      <a:noFill/>
-                      <a:prstDash val="solid"/>
-                    </a:lnBlToTr>
-                    <a:noFill/>
-                  </a:tcPr>
-                </a:tc>
-                <a:extLst>
-                  <a:ext uri="{0D108BD9-81ED-4DB2-BD59-A6C34878D82A}">
-                    <a16:rowId xmlns:a16="http://schemas.microsoft.com/office/drawing/2014/main" val="3766630617"/>
-                  </a:ext>
-                </a:extLst>
-              </a:tr>
-              <a:tr h="548640">
-                <a:tc>
-                  <a:txBody>
-                    <a:bodyPr/>
-                    <a:lstStyle/>
-                    <a:p>
-                      <a:endParaRPr lang="en-GB" sz="1400" dirty="0">
-                        <a:latin typeface="+mn-lt"/>
-                      </a:endParaRPr>
-                    </a:p>
-                  </a:txBody>
-                  <a:tcPr anchor="ctr">
-                    <a:lnL w="38100" cap="flat" cmpd="sng" algn="ctr">
-                      <a:noFill/>
-                      <a:prstDash val="solid"/>
-                      <a:round/>
-                      <a:headEnd type="none" w="med" len="med"/>
-                      <a:tailEnd type="none" w="med" len="med"/>
-                    </a:lnL>
-                    <a:lnR w="12700" cap="flat" cmpd="sng" algn="ctr">
-                      <a:solidFill>
-                        <a:schemeClr val="accent2">
-                          <a:lumMod val="75000"/>
-                        </a:schemeClr>
-                      </a:solidFill>
-                      <a:prstDash val="solid"/>
-                      <a:round/>
-                      <a:headEnd type="none" w="med" len="med"/>
-                      <a:tailEnd type="none" w="med" len="med"/>
-                    </a:lnR>
-                    <a:lnT w="38100" cap="flat" cmpd="sng" algn="ctr">
-                      <a:solidFill>
-                        <a:schemeClr val="accent2">
-                          <a:lumMod val="75000"/>
-                        </a:schemeClr>
-                      </a:solidFill>
-                      <a:prstDash val="solid"/>
-                      <a:round/>
-                      <a:headEnd type="none" w="med" len="med"/>
-                      <a:tailEnd type="none" w="med" len="med"/>
-                    </a:lnT>
-                    <a:lnB w="12700" cap="flat" cmpd="sng" algn="ctr">
-                      <a:solidFill>
-                        <a:schemeClr val="accent2">
-                          <a:lumMod val="75000"/>
-                        </a:schemeClr>
-                      </a:solidFill>
-                      <a:prstDash val="solid"/>
-                      <a:round/>
-                      <a:headEnd type="none" w="med" len="med"/>
-                      <a:tailEnd type="none" w="med" len="med"/>
-                    </a:lnB>
-                    <a:noFill/>
-                  </a:tcPr>
-                </a:tc>
-                <a:tc>
-                  <a:txBody>
-                    <a:bodyPr/>
-                    <a:lstStyle/>
-                    <a:p>
-                      <a:endParaRPr lang="en-GB" sz="1400" dirty="0">
-                        <a:latin typeface="+mn-lt"/>
-                      </a:endParaRPr>
-                    </a:p>
-                  </a:txBody>
-                  <a:tcPr anchor="ctr">
-                    <a:lnL w="12700" cap="flat" cmpd="sng" algn="ctr">
-                      <a:solidFill>
-                        <a:schemeClr val="accent2">
-                          <a:lumMod val="75000"/>
-                        </a:schemeClr>
-                      </a:solidFill>
-                      <a:prstDash val="solid"/>
-                      <a:round/>
-                      <a:headEnd type="none" w="med" len="med"/>
-                      <a:tailEnd type="none" w="med" len="med"/>
-                    </a:lnL>
-                    <a:lnR w="12700" cap="flat" cmpd="sng" algn="ctr">
-                      <a:solidFill>
-                        <a:schemeClr val="accent2">
-                          <a:lumMod val="75000"/>
-                        </a:schemeClr>
-                      </a:solidFill>
-                      <a:prstDash val="solid"/>
-                      <a:round/>
-                      <a:headEnd type="none" w="med" len="med"/>
-                      <a:tailEnd type="none" w="med" len="med"/>
-                    </a:lnR>
-                    <a:lnT w="38100" cap="flat" cmpd="sng" algn="ctr">
-                      <a:solidFill>
-                        <a:schemeClr val="accent2">
-                          <a:lumMod val="75000"/>
-                        </a:schemeClr>
-                      </a:solidFill>
-                      <a:prstDash val="solid"/>
-                      <a:round/>
-                      <a:headEnd type="none" w="med" len="med"/>
-                      <a:tailEnd type="none" w="med" len="med"/>
-                    </a:lnT>
-                    <a:lnB w="12700" cap="flat" cmpd="sng" algn="ctr">
-                      <a:solidFill>
-                        <a:schemeClr val="accent2">
-                          <a:lumMod val="75000"/>
-                        </a:schemeClr>
-                      </a:solidFill>
-                      <a:prstDash val="solid"/>
-                      <a:round/>
-                      <a:headEnd type="none" w="med" len="med"/>
-                      <a:tailEnd type="none" w="med" len="med"/>
-                    </a:lnB>
-                    <a:noFill/>
-                  </a:tcPr>
-                </a:tc>
-                <a:tc>
-                  <a:txBody>
-                    <a:bodyPr/>
-                    <a:lstStyle/>
-                    <a:p>
-                      <a:endParaRPr lang="en-GB" sz="1400" dirty="0">
-                        <a:latin typeface="+mn-lt"/>
-                      </a:endParaRPr>
-                    </a:p>
-                  </a:txBody>
-                  <a:tcPr anchor="ctr">
-                    <a:lnL w="12700" cap="flat" cmpd="sng" algn="ctr">
-                      <a:solidFill>
-                        <a:schemeClr val="accent2">
-                          <a:lumMod val="75000"/>
-                        </a:schemeClr>
-                      </a:solidFill>
-                      <a:prstDash val="solid"/>
-                      <a:round/>
-                      <a:headEnd type="none" w="med" len="med"/>
-                      <a:tailEnd type="none" w="med" len="med"/>
-                    </a:lnL>
-                    <a:lnR w="12700" cap="flat" cmpd="sng" algn="ctr">
-                      <a:solidFill>
-                        <a:schemeClr val="accent2">
-                          <a:lumMod val="75000"/>
-                        </a:schemeClr>
-                      </a:solidFill>
-                      <a:prstDash val="solid"/>
-                      <a:round/>
-                      <a:headEnd type="none" w="med" len="med"/>
-                      <a:tailEnd type="none" w="med" len="med"/>
-                    </a:lnR>
-                    <a:lnT w="38100" cap="flat" cmpd="sng" algn="ctr">
-                      <a:solidFill>
-                        <a:schemeClr val="accent2">
-                          <a:lumMod val="75000"/>
-                        </a:schemeClr>
-                      </a:solidFill>
-                      <a:prstDash val="solid"/>
-                      <a:round/>
-                      <a:headEnd type="none" w="med" len="med"/>
-                      <a:tailEnd type="none" w="med" len="med"/>
-                    </a:lnT>
-                    <a:lnB w="12700" cap="flat" cmpd="sng" algn="ctr">
-                      <a:solidFill>
-                        <a:schemeClr val="accent2">
-                          <a:lumMod val="75000"/>
-                        </a:schemeClr>
-                      </a:solidFill>
-                      <a:prstDash val="solid"/>
-                      <a:round/>
-                      <a:headEnd type="none" w="med" len="med"/>
-                      <a:tailEnd type="none" w="med" len="med"/>
-                    </a:lnB>
-                    <a:noFill/>
-                  </a:tcPr>
-                </a:tc>
-                <a:tc>
-                  <a:txBody>
-                    <a:bodyPr/>
-                    <a:lstStyle/>
-                    <a:p>
-                      <a:endParaRPr lang="en-GB" sz="1400" dirty="0">
-                        <a:latin typeface="+mn-lt"/>
-                      </a:endParaRPr>
-                    </a:p>
-                  </a:txBody>
-                  <a:tcPr anchor="ctr">
-                    <a:lnL w="12700" cap="flat" cmpd="sng" algn="ctr">
-                      <a:solidFill>
-                        <a:schemeClr val="accent2">
-                          <a:lumMod val="75000"/>
-                        </a:schemeClr>
-                      </a:solidFill>
-                      <a:prstDash val="solid"/>
-                      <a:round/>
-                      <a:headEnd type="none" w="med" len="med"/>
-                      <a:tailEnd type="none" w="med" len="med"/>
-                    </a:lnL>
-                    <a:lnR w="38100" cap="flat" cmpd="sng" algn="ctr">
-                      <a:noFill/>
-                      <a:prstDash val="solid"/>
-                      <a:round/>
-                      <a:headEnd type="none" w="med" len="med"/>
-                      <a:tailEnd type="none" w="med" len="med"/>
-                    </a:lnR>
-                    <a:lnT w="38100" cap="flat" cmpd="sng" algn="ctr">
-                      <a:solidFill>
-                        <a:schemeClr val="accent2">
-                          <a:lumMod val="75000"/>
-                        </a:schemeClr>
-                      </a:solidFill>
-                      <a:prstDash val="solid"/>
-                      <a:round/>
-                      <a:headEnd type="none" w="med" len="med"/>
-                      <a:tailEnd type="none" w="med" len="med"/>
-                    </a:lnT>
-                    <a:lnB w="12700" cap="flat" cmpd="sng" algn="ctr">
-                      <a:solidFill>
-                        <a:schemeClr val="accent2">
-                          <a:lumMod val="75000"/>
-                        </a:schemeClr>
-                      </a:solidFill>
-                      <a:prstDash val="solid"/>
-                      <a:round/>
-                      <a:headEnd type="none" w="med" len="med"/>
-                      <a:tailEnd type="none" w="med" len="med"/>
-                    </a:lnB>
-                    <a:noFill/>
-                  </a:tcPr>
-                </a:tc>
-                <a:extLst>
-                  <a:ext uri="{0D108BD9-81ED-4DB2-BD59-A6C34878D82A}">
-                    <a16:rowId xmlns:a16="http://schemas.microsoft.com/office/drawing/2014/main" val="3446274366"/>
-                  </a:ext>
-                </a:extLst>
-              </a:tr>
-              <a:tr h="548640">
-                <a:tc>
-                  <a:txBody>
-                    <a:bodyPr/>
-                    <a:lstStyle/>
-                    <a:p>
-                      <a:endParaRPr lang="en-GB" sz="1400" dirty="0">
-                        <a:latin typeface="+mn-lt"/>
-                      </a:endParaRPr>
-                    </a:p>
-                  </a:txBody>
-                  <a:tcPr anchor="ctr">
-                    <a:lnL w="38100" cap="flat" cmpd="sng" algn="ctr">
-                      <a:noFill/>
-                      <a:prstDash val="solid"/>
-                      <a:round/>
-                      <a:headEnd type="none" w="med" len="med"/>
-                      <a:tailEnd type="none" w="med" len="med"/>
-                    </a:lnL>
-                    <a:lnR w="12700" cap="flat" cmpd="sng" algn="ctr">
-                      <a:solidFill>
-                        <a:schemeClr val="accent2">
-                          <a:lumMod val="75000"/>
-                        </a:schemeClr>
-                      </a:solidFill>
-                      <a:prstDash val="solid"/>
-                      <a:round/>
-                      <a:headEnd type="none" w="med" len="med"/>
-                      <a:tailEnd type="none" w="med" len="med"/>
-                    </a:lnR>
-                    <a:lnT w="12700" cap="flat" cmpd="sng" algn="ctr">
-                      <a:solidFill>
-                        <a:schemeClr val="accent2">
-                          <a:lumMod val="75000"/>
-                        </a:schemeClr>
-                      </a:solidFill>
-                      <a:prstDash val="solid"/>
-                      <a:round/>
-                      <a:headEnd type="none" w="med" len="med"/>
-                      <a:tailEnd type="none" w="med" len="med"/>
-                    </a:lnT>
-                    <a:lnB w="12700" cap="flat" cmpd="sng" algn="ctr">
-                      <a:solidFill>
-                        <a:schemeClr val="accent2">
-                          <a:lumMod val="75000"/>
-                        </a:schemeClr>
-                      </a:solidFill>
-                      <a:prstDash val="solid"/>
-                      <a:round/>
-                      <a:headEnd type="none" w="med" len="med"/>
-                      <a:tailEnd type="none" w="med" len="med"/>
-                    </a:lnB>
-                    <a:solidFill>
-                      <a:schemeClr val="accent5"/>
-                    </a:solidFill>
-                  </a:tcPr>
-                </a:tc>
-                <a:tc>
-                  <a:txBody>
-                    <a:bodyPr/>
-                    <a:lstStyle/>
-                    <a:p>
-                      <a:endParaRPr lang="en-GB" sz="1400" dirty="0">
-                        <a:latin typeface="+mn-lt"/>
-                      </a:endParaRPr>
-                    </a:p>
-                  </a:txBody>
-                  <a:tcPr anchor="ctr">
-                    <a:lnL w="12700" cap="flat" cmpd="sng" algn="ctr">
-                      <a:solidFill>
-                        <a:schemeClr val="accent2">
-                          <a:lumMod val="75000"/>
-                        </a:schemeClr>
-                      </a:solidFill>
-                      <a:prstDash val="solid"/>
-                      <a:round/>
-                      <a:headEnd type="none" w="med" len="med"/>
-                      <a:tailEnd type="none" w="med" len="med"/>
-                    </a:lnL>
-                    <a:lnR w="12700" cap="flat" cmpd="sng" algn="ctr">
-                      <a:solidFill>
-                        <a:schemeClr val="accent2">
-                          <a:lumMod val="75000"/>
-                        </a:schemeClr>
-                      </a:solidFill>
-                      <a:prstDash val="solid"/>
-                      <a:round/>
-                      <a:headEnd type="none" w="med" len="med"/>
-                      <a:tailEnd type="none" w="med" len="med"/>
-                    </a:lnR>
-                    <a:lnT w="12700" cap="flat" cmpd="sng" algn="ctr">
-                      <a:solidFill>
-                        <a:schemeClr val="accent2">
-                          <a:lumMod val="75000"/>
-                        </a:schemeClr>
-                      </a:solidFill>
-                      <a:prstDash val="solid"/>
-                      <a:round/>
-                      <a:headEnd type="none" w="med" len="med"/>
-                      <a:tailEnd type="none" w="med" len="med"/>
-                    </a:lnT>
-                    <a:lnB w="12700" cap="flat" cmpd="sng" algn="ctr">
-                      <a:solidFill>
-                        <a:schemeClr val="accent2">
-                          <a:lumMod val="75000"/>
-                        </a:schemeClr>
-                      </a:solidFill>
-                      <a:prstDash val="solid"/>
-                      <a:round/>
-                      <a:headEnd type="none" w="med" len="med"/>
-                      <a:tailEnd type="none" w="med" len="med"/>
-                    </a:lnB>
-                    <a:solidFill>
-                      <a:schemeClr val="accent5"/>
-                    </a:solidFill>
-                  </a:tcPr>
-                </a:tc>
-                <a:tc>
-                  <a:txBody>
-                    <a:bodyPr/>
-                    <a:lstStyle/>
-                    <a:p>
-                      <a:endParaRPr lang="en-GB" sz="1400" dirty="0">
-                        <a:latin typeface="+mn-lt"/>
-                      </a:endParaRPr>
-                    </a:p>
-                  </a:txBody>
-                  <a:tcPr anchor="ctr">
-                    <a:lnL w="12700" cap="flat" cmpd="sng" algn="ctr">
-                      <a:solidFill>
-                        <a:schemeClr val="accent2">
-                          <a:lumMod val="75000"/>
-                        </a:schemeClr>
-                      </a:solidFill>
-                      <a:prstDash val="solid"/>
-                      <a:round/>
-                      <a:headEnd type="none" w="med" len="med"/>
-                      <a:tailEnd type="none" w="med" len="med"/>
-                    </a:lnL>
-                    <a:lnR w="12700" cap="flat" cmpd="sng" algn="ctr">
-                      <a:solidFill>
-                        <a:schemeClr val="accent2">
-                          <a:lumMod val="75000"/>
-                        </a:schemeClr>
-                      </a:solidFill>
-                      <a:prstDash val="solid"/>
-                      <a:round/>
-                      <a:headEnd type="none" w="med" len="med"/>
-                      <a:tailEnd type="none" w="med" len="med"/>
-                    </a:lnR>
-                    <a:lnT w="12700" cap="flat" cmpd="sng" algn="ctr">
-                      <a:solidFill>
-                        <a:schemeClr val="accent2">
-                          <a:lumMod val="75000"/>
-                        </a:schemeClr>
-                      </a:solidFill>
-                      <a:prstDash val="solid"/>
-                      <a:round/>
-                      <a:headEnd type="none" w="med" len="med"/>
-                      <a:tailEnd type="none" w="med" len="med"/>
-                    </a:lnT>
-                    <a:lnB w="12700" cap="flat" cmpd="sng" algn="ctr">
-                      <a:solidFill>
-                        <a:schemeClr val="accent2">
-                          <a:lumMod val="75000"/>
-                        </a:schemeClr>
-                      </a:solidFill>
-                      <a:prstDash val="solid"/>
-                      <a:round/>
-                      <a:headEnd type="none" w="med" len="med"/>
-                      <a:tailEnd type="none" w="med" len="med"/>
-                    </a:lnB>
-                    <a:solidFill>
-                      <a:schemeClr val="accent5"/>
-                    </a:solidFill>
-                  </a:tcPr>
-                </a:tc>
-                <a:tc>
-                  <a:txBody>
-                    <a:bodyPr/>
-                    <a:lstStyle/>
-                    <a:p>
-                      <a:endParaRPr lang="en-GB" sz="1400" dirty="0">
-                        <a:latin typeface="+mn-lt"/>
-                      </a:endParaRPr>
-                    </a:p>
-                  </a:txBody>
-                  <a:tcPr anchor="ctr">
-                    <a:lnL w="12700" cap="flat" cmpd="sng" algn="ctr">
-                      <a:solidFill>
-                        <a:schemeClr val="accent2">
-                          <a:lumMod val="75000"/>
-                        </a:schemeClr>
-                      </a:solidFill>
-                      <a:prstDash val="solid"/>
-                      <a:round/>
-                      <a:headEnd type="none" w="med" len="med"/>
-                      <a:tailEnd type="none" w="med" len="med"/>
-                    </a:lnL>
-                    <a:lnR w="38100" cap="flat" cmpd="sng" algn="ctr">
-                      <a:noFill/>
-                      <a:prstDash val="solid"/>
-                      <a:round/>
-                      <a:headEnd type="none" w="med" len="med"/>
-                      <a:tailEnd type="none" w="med" len="med"/>
-                    </a:lnR>
-                    <a:lnT w="12700" cap="flat" cmpd="sng" algn="ctr">
-                      <a:solidFill>
-                        <a:schemeClr val="accent2">
-                          <a:lumMod val="75000"/>
-                        </a:schemeClr>
-                      </a:solidFill>
-                      <a:prstDash val="solid"/>
-                      <a:round/>
-                      <a:headEnd type="none" w="med" len="med"/>
-                      <a:tailEnd type="none" w="med" len="med"/>
-                    </a:lnT>
-                    <a:lnB w="12700" cap="flat" cmpd="sng" algn="ctr">
-                      <a:solidFill>
-                        <a:schemeClr val="accent2">
-                          <a:lumMod val="75000"/>
-                        </a:schemeClr>
-                      </a:solidFill>
-                      <a:prstDash val="solid"/>
-                      <a:round/>
-                      <a:headEnd type="none" w="med" len="med"/>
-                      <a:tailEnd type="none" w="med" len="med"/>
-                    </a:lnB>
-                    <a:solidFill>
-                      <a:schemeClr val="accent5"/>
-                    </a:solidFill>
-                  </a:tcPr>
-                </a:tc>
-                <a:extLst>
-                  <a:ext uri="{0D108BD9-81ED-4DB2-BD59-A6C34878D82A}">
-                    <a16:rowId xmlns:a16="http://schemas.microsoft.com/office/drawing/2014/main" val="1758271508"/>
-                  </a:ext>
-                </a:extLst>
-              </a:tr>
-              <a:tr h="548640">
-                <a:tc>
-                  <a:txBody>
-                    <a:bodyPr/>
-                    <a:lstStyle/>
-                    <a:p>
-                      <a:endParaRPr lang="en-GB" sz="1400" dirty="0">
-                        <a:latin typeface="+mn-lt"/>
-                      </a:endParaRPr>
-                    </a:p>
-                  </a:txBody>
-                  <a:tcPr anchor="ctr">
-                    <a:lnL w="38100" cap="flat" cmpd="sng" algn="ctr">
-                      <a:noFill/>
-                      <a:prstDash val="solid"/>
-                      <a:round/>
-                      <a:headEnd type="none" w="med" len="med"/>
-                      <a:tailEnd type="none" w="med" len="med"/>
-                    </a:lnL>
-                    <a:lnR w="12700" cap="flat" cmpd="sng" algn="ctr">
-                      <a:solidFill>
-                        <a:schemeClr val="accent2">
-                          <a:lumMod val="75000"/>
-                        </a:schemeClr>
-                      </a:solidFill>
-                      <a:prstDash val="solid"/>
-                      <a:round/>
-                      <a:headEnd type="none" w="med" len="med"/>
-                      <a:tailEnd type="none" w="med" len="med"/>
-                    </a:lnR>
-                    <a:lnT w="12700" cap="flat" cmpd="sng" algn="ctr">
-                      <a:solidFill>
-                        <a:schemeClr val="accent2">
-                          <a:lumMod val="75000"/>
-                        </a:schemeClr>
-                      </a:solidFill>
-                      <a:prstDash val="solid"/>
-                      <a:round/>
-                      <a:headEnd type="none" w="med" len="med"/>
-                      <a:tailEnd type="none" w="med" len="med"/>
-                    </a:lnT>
-                    <a:lnB w="12700" cap="flat" cmpd="sng" algn="ctr">
-                      <a:solidFill>
-                        <a:schemeClr val="accent2">
-                          <a:lumMod val="75000"/>
-                        </a:schemeClr>
-                      </a:solidFill>
-                      <a:prstDash val="solid"/>
-                      <a:round/>
-                      <a:headEnd type="none" w="med" len="med"/>
-                      <a:tailEnd type="none" w="med" len="med"/>
-                    </a:lnB>
-                    <a:noFill/>
-                  </a:tcPr>
-                </a:tc>
-                <a:tc>
-                  <a:txBody>
-                    <a:bodyPr/>
-                    <a:lstStyle/>
-                    <a:p>
-                      <a:endParaRPr lang="en-GB" sz="1400" dirty="0">
-                        <a:latin typeface="+mn-lt"/>
-                      </a:endParaRPr>
-                    </a:p>
-                  </a:txBody>
-                  <a:tcPr anchor="ctr">
-                    <a:lnL w="12700" cap="flat" cmpd="sng" algn="ctr">
-                      <a:solidFill>
-                        <a:schemeClr val="accent2">
-                          <a:lumMod val="75000"/>
-                        </a:schemeClr>
-                      </a:solidFill>
-                      <a:prstDash val="solid"/>
-                      <a:round/>
-                      <a:headEnd type="none" w="med" len="med"/>
-                      <a:tailEnd type="none" w="med" len="med"/>
-                    </a:lnL>
-                    <a:lnR w="12700" cap="flat" cmpd="sng" algn="ctr">
-                      <a:solidFill>
-                        <a:schemeClr val="accent2">
-                          <a:lumMod val="75000"/>
-                        </a:schemeClr>
-                      </a:solidFill>
-                      <a:prstDash val="solid"/>
-                      <a:round/>
-                      <a:headEnd type="none" w="med" len="med"/>
-                      <a:tailEnd type="none" w="med" len="med"/>
-                    </a:lnR>
-                    <a:lnT w="12700" cap="flat" cmpd="sng" algn="ctr">
-                      <a:solidFill>
-                        <a:schemeClr val="accent2">
-                          <a:lumMod val="75000"/>
-                        </a:schemeClr>
-                      </a:solidFill>
-                      <a:prstDash val="solid"/>
-                      <a:round/>
-                      <a:headEnd type="none" w="med" len="med"/>
-                      <a:tailEnd type="none" w="med" len="med"/>
-                    </a:lnT>
-                    <a:lnB w="12700" cap="flat" cmpd="sng" algn="ctr">
-                      <a:solidFill>
-                        <a:schemeClr val="accent2">
-                          <a:lumMod val="75000"/>
-                        </a:schemeClr>
-                      </a:solidFill>
-                      <a:prstDash val="solid"/>
-                      <a:round/>
-                      <a:headEnd type="none" w="med" len="med"/>
-                      <a:tailEnd type="none" w="med" len="med"/>
-                    </a:lnB>
-                    <a:noFill/>
-                  </a:tcPr>
-                </a:tc>
-                <a:tc>
-                  <a:txBody>
-                    <a:bodyPr/>
-                    <a:lstStyle/>
-                    <a:p>
-                      <a:endParaRPr lang="en-GB" sz="1400" dirty="0">
-                        <a:latin typeface="+mn-lt"/>
-                      </a:endParaRPr>
-                    </a:p>
-                  </a:txBody>
-                  <a:tcPr anchor="ctr">
-                    <a:lnL w="12700" cap="flat" cmpd="sng" algn="ctr">
-                      <a:solidFill>
-                        <a:schemeClr val="accent2">
-                          <a:lumMod val="75000"/>
-                        </a:schemeClr>
-                      </a:solidFill>
-                      <a:prstDash val="solid"/>
-                      <a:round/>
-                      <a:headEnd type="none" w="med" len="med"/>
-                      <a:tailEnd type="none" w="med" len="med"/>
-                    </a:lnL>
-                    <a:lnR w="12700" cap="flat" cmpd="sng" algn="ctr">
-                      <a:solidFill>
-                        <a:schemeClr val="accent2">
-                          <a:lumMod val="75000"/>
-                        </a:schemeClr>
-                      </a:solidFill>
-                      <a:prstDash val="solid"/>
-                      <a:round/>
-                      <a:headEnd type="none" w="med" len="med"/>
-                      <a:tailEnd type="none" w="med" len="med"/>
-                    </a:lnR>
-                    <a:lnT w="12700" cap="flat" cmpd="sng" algn="ctr">
-                      <a:solidFill>
-                        <a:schemeClr val="accent2">
-                          <a:lumMod val="75000"/>
-                        </a:schemeClr>
-                      </a:solidFill>
-                      <a:prstDash val="solid"/>
-                      <a:round/>
-                      <a:headEnd type="none" w="med" len="med"/>
-                      <a:tailEnd type="none" w="med" len="med"/>
-                    </a:lnT>
-                    <a:lnB w="12700" cap="flat" cmpd="sng" algn="ctr">
-                      <a:solidFill>
-                        <a:schemeClr val="accent2">
-                          <a:lumMod val="75000"/>
-                        </a:schemeClr>
-                      </a:solidFill>
-                      <a:prstDash val="solid"/>
-                      <a:round/>
-                      <a:headEnd type="none" w="med" len="med"/>
-                      <a:tailEnd type="none" w="med" len="med"/>
-                    </a:lnB>
-                    <a:noFill/>
-                  </a:tcPr>
-                </a:tc>
-                <a:tc>
-                  <a:txBody>
-                    <a:bodyPr/>
-                    <a:lstStyle/>
-                    <a:p>
-                      <a:endParaRPr lang="en-GB" sz="1400" dirty="0">
-                        <a:latin typeface="+mn-lt"/>
-                      </a:endParaRPr>
-                    </a:p>
-                  </a:txBody>
-                  <a:tcPr anchor="ctr">
-                    <a:lnL w="12700" cap="flat" cmpd="sng" algn="ctr">
-                      <a:solidFill>
-                        <a:schemeClr val="accent2">
-                          <a:lumMod val="75000"/>
-                        </a:schemeClr>
-                      </a:solidFill>
-                      <a:prstDash val="solid"/>
-                      <a:round/>
-                      <a:headEnd type="none" w="med" len="med"/>
-                      <a:tailEnd type="none" w="med" len="med"/>
-                    </a:lnL>
-                    <a:lnR w="38100" cap="flat" cmpd="sng" algn="ctr">
-                      <a:noFill/>
-                      <a:prstDash val="solid"/>
-                      <a:round/>
-                      <a:headEnd type="none" w="med" len="med"/>
-                      <a:tailEnd type="none" w="med" len="med"/>
-                    </a:lnR>
-                    <a:lnT w="12700" cap="flat" cmpd="sng" algn="ctr">
-                      <a:solidFill>
-                        <a:schemeClr val="accent2">
-                          <a:lumMod val="75000"/>
-                        </a:schemeClr>
-                      </a:solidFill>
-                      <a:prstDash val="solid"/>
-                      <a:round/>
-                      <a:headEnd type="none" w="med" len="med"/>
-                      <a:tailEnd type="none" w="med" len="med"/>
-                    </a:lnT>
-                    <a:lnB w="12700" cap="flat" cmpd="sng" algn="ctr">
-                      <a:solidFill>
-                        <a:schemeClr val="accent2">
-                          <a:lumMod val="75000"/>
-                        </a:schemeClr>
-                      </a:solidFill>
-                      <a:prstDash val="solid"/>
-                      <a:round/>
-                      <a:headEnd type="none" w="med" len="med"/>
-                      <a:tailEnd type="none" w="med" len="med"/>
-                    </a:lnB>
-                    <a:noFill/>
-                  </a:tcPr>
-                </a:tc>
-                <a:extLst>
-                  <a:ext uri="{0D108BD9-81ED-4DB2-BD59-A6C34878D82A}">
-                    <a16:rowId xmlns:a16="http://schemas.microsoft.com/office/drawing/2014/main" val="3736384641"/>
-                  </a:ext>
-                </a:extLst>
-              </a:tr>
-              <a:tr h="548640">
-                <a:tc>
-                  <a:txBody>
-                    <a:bodyPr/>
-                    <a:lstStyle/>
-                    <a:p>
-                      <a:endParaRPr lang="en-GB" sz="1400" dirty="0">
-                        <a:latin typeface="+mn-lt"/>
-                      </a:endParaRPr>
-                    </a:p>
-                  </a:txBody>
-                  <a:tcPr anchor="ctr">
-                    <a:lnL w="38100" cap="flat" cmpd="sng" algn="ctr">
-                      <a:noFill/>
-                      <a:prstDash val="solid"/>
-                      <a:round/>
-                      <a:headEnd type="none" w="med" len="med"/>
-                      <a:tailEnd type="none" w="med" len="med"/>
-                    </a:lnL>
-                    <a:lnR w="12700" cap="flat" cmpd="sng" algn="ctr">
-                      <a:solidFill>
-                        <a:schemeClr val="accent2">
-                          <a:lumMod val="75000"/>
-                        </a:schemeClr>
-                      </a:solidFill>
-                      <a:prstDash val="solid"/>
-                      <a:round/>
-                      <a:headEnd type="none" w="med" len="med"/>
-                      <a:tailEnd type="none" w="med" len="med"/>
-                    </a:lnR>
-                    <a:lnT w="12700" cap="flat" cmpd="sng" algn="ctr">
-                      <a:solidFill>
-                        <a:schemeClr val="accent2">
-                          <a:lumMod val="75000"/>
-                        </a:schemeClr>
-                      </a:solidFill>
-                      <a:prstDash val="solid"/>
-                      <a:round/>
-                      <a:headEnd type="none" w="med" len="med"/>
-                      <a:tailEnd type="none" w="med" len="med"/>
-                    </a:lnT>
-                    <a:lnB w="12700" cap="flat" cmpd="sng" algn="ctr">
-                      <a:solidFill>
-                        <a:schemeClr val="accent2">
-                          <a:lumMod val="75000"/>
-                        </a:schemeClr>
-                      </a:solidFill>
-                      <a:prstDash val="solid"/>
-                      <a:round/>
-                      <a:headEnd type="none" w="med" len="med"/>
-                      <a:tailEnd type="none" w="med" len="med"/>
-                    </a:lnB>
-                    <a:solidFill>
-                      <a:schemeClr val="accent5"/>
-                    </a:solidFill>
-                  </a:tcPr>
-                </a:tc>
-                <a:tc>
-                  <a:txBody>
-                    <a:bodyPr/>
-                    <a:lstStyle/>
-                    <a:p>
-                      <a:endParaRPr lang="en-GB" sz="1400" dirty="0">
-                        <a:latin typeface="+mn-lt"/>
-                      </a:endParaRPr>
-                    </a:p>
-                  </a:txBody>
-                  <a:tcPr anchor="ctr">
-                    <a:lnL w="12700" cap="flat" cmpd="sng" algn="ctr">
-                      <a:solidFill>
-                        <a:schemeClr val="accent2">
-                          <a:lumMod val="75000"/>
-                        </a:schemeClr>
-                      </a:solidFill>
-                      <a:prstDash val="solid"/>
-                      <a:round/>
-                      <a:headEnd type="none" w="med" len="med"/>
-                      <a:tailEnd type="none" w="med" len="med"/>
-                    </a:lnL>
-                    <a:lnR w="12700" cap="flat" cmpd="sng" algn="ctr">
-                      <a:solidFill>
-                        <a:schemeClr val="accent2">
-                          <a:lumMod val="75000"/>
-                        </a:schemeClr>
-                      </a:solidFill>
-                      <a:prstDash val="solid"/>
-                      <a:round/>
-                      <a:headEnd type="none" w="med" len="med"/>
-                      <a:tailEnd type="none" w="med" len="med"/>
-                    </a:lnR>
-                    <a:lnT w="12700" cap="flat" cmpd="sng" algn="ctr">
-                      <a:solidFill>
-                        <a:schemeClr val="accent2">
-                          <a:lumMod val="75000"/>
-                        </a:schemeClr>
-                      </a:solidFill>
-                      <a:prstDash val="solid"/>
-                      <a:round/>
-                      <a:headEnd type="none" w="med" len="med"/>
-                      <a:tailEnd type="none" w="med" len="med"/>
-                    </a:lnT>
-                    <a:lnB w="12700" cap="flat" cmpd="sng" algn="ctr">
-                      <a:solidFill>
-                        <a:schemeClr val="accent2">
-                          <a:lumMod val="75000"/>
-                        </a:schemeClr>
-                      </a:solidFill>
-                      <a:prstDash val="solid"/>
-                      <a:round/>
-                      <a:headEnd type="none" w="med" len="med"/>
-                      <a:tailEnd type="none" w="med" len="med"/>
-                    </a:lnB>
-                    <a:solidFill>
-                      <a:schemeClr val="accent5"/>
-                    </a:solidFill>
-                  </a:tcPr>
-                </a:tc>
-                <a:tc>
-                  <a:txBody>
-                    <a:bodyPr/>
-                    <a:lstStyle/>
-                    <a:p>
-                      <a:endParaRPr lang="en-GB" sz="1400" dirty="0">
-                        <a:latin typeface="+mn-lt"/>
-                      </a:endParaRPr>
-                    </a:p>
-                  </a:txBody>
-                  <a:tcPr anchor="ctr">
-                    <a:lnL w="12700" cap="flat" cmpd="sng" algn="ctr">
-                      <a:solidFill>
-                        <a:schemeClr val="accent2">
-                          <a:lumMod val="75000"/>
-                        </a:schemeClr>
-                      </a:solidFill>
-                      <a:prstDash val="solid"/>
-                      <a:round/>
-                      <a:headEnd type="none" w="med" len="med"/>
-                      <a:tailEnd type="none" w="med" len="med"/>
-                    </a:lnL>
-                    <a:lnR w="12700" cap="flat" cmpd="sng" algn="ctr">
-                      <a:solidFill>
-                        <a:schemeClr val="accent2">
-                          <a:lumMod val="75000"/>
-                        </a:schemeClr>
-                      </a:solidFill>
-                      <a:prstDash val="solid"/>
-                      <a:round/>
-                      <a:headEnd type="none" w="med" len="med"/>
-                      <a:tailEnd type="none" w="med" len="med"/>
-                    </a:lnR>
-                    <a:lnT w="12700" cap="flat" cmpd="sng" algn="ctr">
-                      <a:solidFill>
-                        <a:schemeClr val="accent2">
-                          <a:lumMod val="75000"/>
-                        </a:schemeClr>
-                      </a:solidFill>
-                      <a:prstDash val="solid"/>
-                      <a:round/>
-                      <a:headEnd type="none" w="med" len="med"/>
-                      <a:tailEnd type="none" w="med" len="med"/>
-                    </a:lnT>
-                    <a:lnB w="12700" cap="flat" cmpd="sng" algn="ctr">
-                      <a:solidFill>
-                        <a:schemeClr val="accent2">
-                          <a:lumMod val="75000"/>
-                        </a:schemeClr>
-                      </a:solidFill>
-                      <a:prstDash val="solid"/>
-                      <a:round/>
-                      <a:headEnd type="none" w="med" len="med"/>
-                      <a:tailEnd type="none" w="med" len="med"/>
-                    </a:lnB>
-                    <a:solidFill>
-                      <a:schemeClr val="accent5"/>
-                    </a:solidFill>
-                  </a:tcPr>
-                </a:tc>
-                <a:tc>
-                  <a:txBody>
-                    <a:bodyPr/>
-                    <a:lstStyle/>
-                    <a:p>
-                      <a:endParaRPr lang="en-GB" sz="1400" dirty="0">
-                        <a:latin typeface="+mn-lt"/>
-                      </a:endParaRPr>
-                    </a:p>
-                  </a:txBody>
-                  <a:tcPr anchor="ctr">
-                    <a:lnL w="12700" cap="flat" cmpd="sng" algn="ctr">
-                      <a:solidFill>
-                        <a:schemeClr val="accent2">
-                          <a:lumMod val="75000"/>
-                        </a:schemeClr>
-                      </a:solidFill>
-                      <a:prstDash val="solid"/>
-                      <a:round/>
-                      <a:headEnd type="none" w="med" len="med"/>
-                      <a:tailEnd type="none" w="med" len="med"/>
-                    </a:lnL>
-                    <a:lnR w="38100" cap="flat" cmpd="sng" algn="ctr">
-                      <a:noFill/>
-                      <a:prstDash val="solid"/>
-                      <a:round/>
-                      <a:headEnd type="none" w="med" len="med"/>
-                      <a:tailEnd type="none" w="med" len="med"/>
-                    </a:lnR>
-                    <a:lnT w="12700" cap="flat" cmpd="sng" algn="ctr">
-                      <a:solidFill>
-                        <a:schemeClr val="accent2">
-                          <a:lumMod val="75000"/>
-                        </a:schemeClr>
-                      </a:solidFill>
-                      <a:prstDash val="solid"/>
-                      <a:round/>
-                      <a:headEnd type="none" w="med" len="med"/>
-                      <a:tailEnd type="none" w="med" len="med"/>
-                    </a:lnT>
-                    <a:lnB w="12700" cap="flat" cmpd="sng" algn="ctr">
-                      <a:solidFill>
-                        <a:schemeClr val="accent2">
-                          <a:lumMod val="75000"/>
-                        </a:schemeClr>
-                      </a:solidFill>
-                      <a:prstDash val="solid"/>
-                      <a:round/>
-                      <a:headEnd type="none" w="med" len="med"/>
-                      <a:tailEnd type="none" w="med" len="med"/>
-                    </a:lnB>
-                    <a:solidFill>
-                      <a:schemeClr val="accent5"/>
-                    </a:solidFill>
-                  </a:tcPr>
-                </a:tc>
-                <a:extLst>
-                  <a:ext uri="{0D108BD9-81ED-4DB2-BD59-A6C34878D82A}">
-                    <a16:rowId xmlns:a16="http://schemas.microsoft.com/office/drawing/2014/main" val="3090935587"/>
-                  </a:ext>
-                </a:extLst>
-              </a:tr>
-              <a:tr h="548640">
-                <a:tc>
-                  <a:txBody>
-                    <a:bodyPr/>
-                    <a:lstStyle/>
-                    <a:p>
-                      <a:endParaRPr lang="en-GB" sz="1400" dirty="0">
-                        <a:latin typeface="+mn-lt"/>
-                      </a:endParaRPr>
-                    </a:p>
-                  </a:txBody>
-                  <a:tcPr anchor="ctr">
-                    <a:lnL w="38100" cap="flat" cmpd="sng" algn="ctr">
-                      <a:noFill/>
-                      <a:prstDash val="solid"/>
-                      <a:round/>
-                      <a:headEnd type="none" w="med" len="med"/>
-                      <a:tailEnd type="none" w="med" len="med"/>
-                    </a:lnL>
-                    <a:lnR w="12700" cap="flat" cmpd="sng" algn="ctr">
-                      <a:solidFill>
-                        <a:schemeClr val="accent2">
-                          <a:lumMod val="75000"/>
-                        </a:schemeClr>
-                      </a:solidFill>
-                      <a:prstDash val="solid"/>
-                      <a:round/>
-                      <a:headEnd type="none" w="med" len="med"/>
-                      <a:tailEnd type="none" w="med" len="med"/>
-                    </a:lnR>
-                    <a:lnT w="12700" cap="flat" cmpd="sng" algn="ctr">
-                      <a:solidFill>
-                        <a:schemeClr val="accent2">
-                          <a:lumMod val="75000"/>
-                        </a:schemeClr>
-                      </a:solidFill>
-                      <a:prstDash val="solid"/>
-                      <a:round/>
-                      <a:headEnd type="none" w="med" len="med"/>
-                      <a:tailEnd type="none" w="med" len="med"/>
-                    </a:lnT>
-                    <a:lnB w="12700" cap="flat" cmpd="sng" algn="ctr">
-                      <a:solidFill>
-                        <a:schemeClr val="accent2">
-                          <a:lumMod val="75000"/>
-                        </a:schemeClr>
-                      </a:solidFill>
-                      <a:prstDash val="solid"/>
-                      <a:round/>
-                      <a:headEnd type="none" w="med" len="med"/>
-                      <a:tailEnd type="none" w="med" len="med"/>
-                    </a:lnB>
-                    <a:noFill/>
-                  </a:tcPr>
-                </a:tc>
-                <a:tc>
-                  <a:txBody>
-                    <a:bodyPr/>
-                    <a:lstStyle/>
-                    <a:p>
-                      <a:endParaRPr lang="en-GB" sz="1400" dirty="0">
-                        <a:latin typeface="+mn-lt"/>
-                      </a:endParaRPr>
-                    </a:p>
-                  </a:txBody>
-                  <a:tcPr anchor="ctr">
-                    <a:lnL w="12700" cap="flat" cmpd="sng" algn="ctr">
-                      <a:solidFill>
-                        <a:schemeClr val="accent2">
-                          <a:lumMod val="75000"/>
-                        </a:schemeClr>
-                      </a:solidFill>
-                      <a:prstDash val="solid"/>
-                      <a:round/>
-                      <a:headEnd type="none" w="med" len="med"/>
-                      <a:tailEnd type="none" w="med" len="med"/>
-                    </a:lnL>
-                    <a:lnR w="12700" cap="flat" cmpd="sng" algn="ctr">
-                      <a:solidFill>
-                        <a:schemeClr val="accent2">
-                          <a:lumMod val="75000"/>
-                        </a:schemeClr>
-                      </a:solidFill>
-                      <a:prstDash val="solid"/>
-                      <a:round/>
-                      <a:headEnd type="none" w="med" len="med"/>
-                      <a:tailEnd type="none" w="med" len="med"/>
-                    </a:lnR>
-                    <a:lnT w="12700" cap="flat" cmpd="sng" algn="ctr">
-                      <a:solidFill>
-                        <a:schemeClr val="accent2">
-                          <a:lumMod val="75000"/>
-                        </a:schemeClr>
-                      </a:solidFill>
-                      <a:prstDash val="solid"/>
-                      <a:round/>
-                      <a:headEnd type="none" w="med" len="med"/>
-                      <a:tailEnd type="none" w="med" len="med"/>
-                    </a:lnT>
-                    <a:lnB w="12700" cap="flat" cmpd="sng" algn="ctr">
-                      <a:solidFill>
-                        <a:schemeClr val="accent2">
-                          <a:lumMod val="75000"/>
-                        </a:schemeClr>
-                      </a:solidFill>
-                      <a:prstDash val="solid"/>
-                      <a:round/>
-                      <a:headEnd type="none" w="med" len="med"/>
-                      <a:tailEnd type="none" w="med" len="med"/>
-                    </a:lnB>
-                    <a:noFill/>
-                  </a:tcPr>
-                </a:tc>
-                <a:tc>
-                  <a:txBody>
-                    <a:bodyPr/>
-                    <a:lstStyle/>
-                    <a:p>
-                      <a:endParaRPr lang="en-GB" sz="1400" dirty="0">
-                        <a:latin typeface="+mn-lt"/>
-                      </a:endParaRPr>
-                    </a:p>
-                  </a:txBody>
-                  <a:tcPr anchor="ctr">
-                    <a:lnL w="12700" cap="flat" cmpd="sng" algn="ctr">
-                      <a:solidFill>
-                        <a:schemeClr val="accent2">
-                          <a:lumMod val="75000"/>
-                        </a:schemeClr>
-                      </a:solidFill>
-                      <a:prstDash val="solid"/>
-                      <a:round/>
-                      <a:headEnd type="none" w="med" len="med"/>
-                      <a:tailEnd type="none" w="med" len="med"/>
-                    </a:lnL>
-                    <a:lnR w="12700" cap="flat" cmpd="sng" algn="ctr">
-                      <a:solidFill>
-                        <a:schemeClr val="accent2">
-                          <a:lumMod val="75000"/>
-                        </a:schemeClr>
-                      </a:solidFill>
-                      <a:prstDash val="solid"/>
-                      <a:round/>
-                      <a:headEnd type="none" w="med" len="med"/>
-                      <a:tailEnd type="none" w="med" len="med"/>
-                    </a:lnR>
-                    <a:lnT w="12700" cap="flat" cmpd="sng" algn="ctr">
-                      <a:solidFill>
-                        <a:schemeClr val="accent2">
-                          <a:lumMod val="75000"/>
-                        </a:schemeClr>
-                      </a:solidFill>
-                      <a:prstDash val="solid"/>
-                      <a:round/>
-                      <a:headEnd type="none" w="med" len="med"/>
-                      <a:tailEnd type="none" w="med" len="med"/>
-                    </a:lnT>
-                    <a:lnB w="12700" cap="flat" cmpd="sng" algn="ctr">
-                      <a:solidFill>
-                        <a:schemeClr val="accent2">
-                          <a:lumMod val="75000"/>
-                        </a:schemeClr>
-                      </a:solidFill>
-                      <a:prstDash val="solid"/>
-                      <a:round/>
-                      <a:headEnd type="none" w="med" len="med"/>
-                      <a:tailEnd type="none" w="med" len="med"/>
-                    </a:lnB>
-                    <a:noFill/>
-                  </a:tcPr>
-                </a:tc>
-                <a:tc>
-                  <a:txBody>
-                    <a:bodyPr/>
-                    <a:lstStyle/>
-                    <a:p>
-                      <a:endParaRPr lang="en-GB" sz="1400" dirty="0">
-                        <a:latin typeface="+mn-lt"/>
-                      </a:endParaRPr>
-                    </a:p>
-                  </a:txBody>
-                  <a:tcPr anchor="ctr">
-                    <a:lnL w="12700" cap="flat" cmpd="sng" algn="ctr">
-                      <a:solidFill>
-                        <a:schemeClr val="accent2">
-                          <a:lumMod val="75000"/>
-                        </a:schemeClr>
-                      </a:solidFill>
-                      <a:prstDash val="solid"/>
-                      <a:round/>
-                      <a:headEnd type="none" w="med" len="med"/>
-                      <a:tailEnd type="none" w="med" len="med"/>
-                    </a:lnL>
-                    <a:lnR w="38100" cap="flat" cmpd="sng" algn="ctr">
-                      <a:noFill/>
-                      <a:prstDash val="solid"/>
-                      <a:round/>
-                      <a:headEnd type="none" w="med" len="med"/>
-                      <a:tailEnd type="none" w="med" len="med"/>
-                    </a:lnR>
-                    <a:lnT w="12700" cap="flat" cmpd="sng" algn="ctr">
-                      <a:solidFill>
-                        <a:schemeClr val="accent2">
-                          <a:lumMod val="75000"/>
-                        </a:schemeClr>
-                      </a:solidFill>
-                      <a:prstDash val="solid"/>
-                      <a:round/>
-                      <a:headEnd type="none" w="med" len="med"/>
-                      <a:tailEnd type="none" w="med" len="med"/>
-                    </a:lnT>
-                    <a:lnB w="12700" cap="flat" cmpd="sng" algn="ctr">
-                      <a:solidFill>
-                        <a:schemeClr val="accent2">
-                          <a:lumMod val="75000"/>
-                        </a:schemeClr>
-                      </a:solidFill>
-                      <a:prstDash val="solid"/>
-                      <a:round/>
-                      <a:headEnd type="none" w="med" len="med"/>
-                      <a:tailEnd type="none" w="med" len="med"/>
-                    </a:lnB>
-                    <a:noFill/>
-                  </a:tcPr>
-                </a:tc>
-                <a:extLst>
-                  <a:ext uri="{0D108BD9-81ED-4DB2-BD59-A6C34878D82A}">
-                    <a16:rowId xmlns:a16="http://schemas.microsoft.com/office/drawing/2014/main" val="446909641"/>
-                  </a:ext>
-                </a:extLst>
-              </a:tr>
-              <a:tr h="548640">
-                <a:tc>
-                  <a:txBody>
-                    <a:bodyPr/>
-                    <a:lstStyle/>
-                    <a:p>
-                      <a:endParaRPr lang="en-GB" sz="1400" dirty="0">
-                        <a:latin typeface="+mn-lt"/>
-                      </a:endParaRPr>
-                    </a:p>
-                  </a:txBody>
-                  <a:tcPr anchor="ctr">
-                    <a:lnL w="38100" cap="flat" cmpd="sng" algn="ctr">
-                      <a:noFill/>
-                      <a:prstDash val="solid"/>
-                      <a:round/>
-                      <a:headEnd type="none" w="med" len="med"/>
-                      <a:tailEnd type="none" w="med" len="med"/>
-                    </a:lnL>
-                    <a:lnR w="12700" cap="flat" cmpd="sng" algn="ctr">
-                      <a:solidFill>
-                        <a:schemeClr val="accent2">
-                          <a:lumMod val="75000"/>
-                        </a:schemeClr>
-                      </a:solidFill>
-                      <a:prstDash val="solid"/>
-                      <a:round/>
-                      <a:headEnd type="none" w="med" len="med"/>
-                      <a:tailEnd type="none" w="med" len="med"/>
-                    </a:lnR>
-                    <a:lnT w="12700" cap="flat" cmpd="sng" algn="ctr">
-                      <a:solidFill>
-                        <a:schemeClr val="accent2">
-                          <a:lumMod val="75000"/>
-                        </a:schemeClr>
-                      </a:solidFill>
-                      <a:prstDash val="solid"/>
-                      <a:round/>
-                      <a:headEnd type="none" w="med" len="med"/>
-                      <a:tailEnd type="none" w="med" len="med"/>
-                    </a:lnT>
-                    <a:lnB w="12700" cap="flat" cmpd="sng" algn="ctr">
-                      <a:solidFill>
-                        <a:schemeClr val="accent2">
-                          <a:lumMod val="75000"/>
-                        </a:schemeClr>
-                      </a:solidFill>
-                      <a:prstDash val="solid"/>
-                      <a:round/>
-                      <a:headEnd type="none" w="med" len="med"/>
-                      <a:tailEnd type="none" w="med" len="med"/>
-                    </a:lnB>
-                    <a:solidFill>
-                      <a:schemeClr val="accent5"/>
-                    </a:solidFill>
-                  </a:tcPr>
-                </a:tc>
-                <a:tc>
-                  <a:txBody>
-                    <a:bodyPr/>
-                    <a:lstStyle/>
-                    <a:p>
-                      <a:endParaRPr lang="en-GB" sz="1400" dirty="0">
-                        <a:latin typeface="+mn-lt"/>
-                      </a:endParaRPr>
-                    </a:p>
-                  </a:txBody>
-                  <a:tcPr anchor="ctr">
-                    <a:lnL w="12700" cap="flat" cmpd="sng" algn="ctr">
-                      <a:solidFill>
-                        <a:schemeClr val="accent2">
-                          <a:lumMod val="75000"/>
-                        </a:schemeClr>
-                      </a:solidFill>
-                      <a:prstDash val="solid"/>
-                      <a:round/>
-                      <a:headEnd type="none" w="med" len="med"/>
-                      <a:tailEnd type="none" w="med" len="med"/>
-                    </a:lnL>
-                    <a:lnR w="12700" cap="flat" cmpd="sng" algn="ctr">
-                      <a:solidFill>
-                        <a:schemeClr val="accent2">
-                          <a:lumMod val="75000"/>
-                        </a:schemeClr>
-                      </a:solidFill>
-                      <a:prstDash val="solid"/>
-                      <a:round/>
-                      <a:headEnd type="none" w="med" len="med"/>
-                      <a:tailEnd type="none" w="med" len="med"/>
-                    </a:lnR>
-                    <a:lnT w="12700" cap="flat" cmpd="sng" algn="ctr">
-                      <a:solidFill>
-                        <a:schemeClr val="accent2">
-                          <a:lumMod val="75000"/>
-                        </a:schemeClr>
-                      </a:solidFill>
-                      <a:prstDash val="solid"/>
-                      <a:round/>
-                      <a:headEnd type="none" w="med" len="med"/>
-                      <a:tailEnd type="none" w="med" len="med"/>
-                    </a:lnT>
-                    <a:lnB w="12700" cap="flat" cmpd="sng" algn="ctr">
-                      <a:solidFill>
-                        <a:schemeClr val="accent2">
-                          <a:lumMod val="75000"/>
-                        </a:schemeClr>
-                      </a:solidFill>
-                      <a:prstDash val="solid"/>
-                      <a:round/>
-                      <a:headEnd type="none" w="med" len="med"/>
-                      <a:tailEnd type="none" w="med" len="med"/>
-                    </a:lnB>
-                    <a:solidFill>
-                      <a:schemeClr val="accent5"/>
-                    </a:solidFill>
-                  </a:tcPr>
-                </a:tc>
-                <a:tc>
-                  <a:txBody>
-                    <a:bodyPr/>
-                    <a:lstStyle/>
-                    <a:p>
-                      <a:endParaRPr lang="en-GB" sz="1400" dirty="0">
-                        <a:latin typeface="+mn-lt"/>
-                      </a:endParaRPr>
-                    </a:p>
-                  </a:txBody>
-                  <a:tcPr anchor="ctr">
-                    <a:lnL w="12700" cap="flat" cmpd="sng" algn="ctr">
-                      <a:solidFill>
-                        <a:schemeClr val="accent2">
-                          <a:lumMod val="75000"/>
-                        </a:schemeClr>
-                      </a:solidFill>
-                      <a:prstDash val="solid"/>
-                      <a:round/>
-                      <a:headEnd type="none" w="med" len="med"/>
-                      <a:tailEnd type="none" w="med" len="med"/>
-                    </a:lnL>
-                    <a:lnR w="12700" cap="flat" cmpd="sng" algn="ctr">
-                      <a:solidFill>
-                        <a:schemeClr val="accent2">
-                          <a:lumMod val="75000"/>
-                        </a:schemeClr>
-                      </a:solidFill>
-                      <a:prstDash val="solid"/>
-                      <a:round/>
-                      <a:headEnd type="none" w="med" len="med"/>
-                      <a:tailEnd type="none" w="med" len="med"/>
-                    </a:lnR>
-                    <a:lnT w="12700" cap="flat" cmpd="sng" algn="ctr">
-                      <a:solidFill>
-                        <a:schemeClr val="accent2">
-                          <a:lumMod val="75000"/>
-                        </a:schemeClr>
-                      </a:solidFill>
-                      <a:prstDash val="solid"/>
-                      <a:round/>
-                      <a:headEnd type="none" w="med" len="med"/>
-                      <a:tailEnd type="none" w="med" len="med"/>
-                    </a:lnT>
-                    <a:lnB w="12700" cap="flat" cmpd="sng" algn="ctr">
-                      <a:solidFill>
-                        <a:schemeClr val="accent2">
-                          <a:lumMod val="75000"/>
-                        </a:schemeClr>
-                      </a:solidFill>
-                      <a:prstDash val="solid"/>
-                      <a:round/>
-                      <a:headEnd type="none" w="med" len="med"/>
-                      <a:tailEnd type="none" w="med" len="med"/>
-                    </a:lnB>
-                    <a:solidFill>
-                      <a:schemeClr val="accent5"/>
-                    </a:solidFill>
-                  </a:tcPr>
-                </a:tc>
-                <a:tc>
-                  <a:txBody>
-                    <a:bodyPr/>
-                    <a:lstStyle/>
-                    <a:p>
-                      <a:endParaRPr lang="en-GB" sz="1400" dirty="0">
-                        <a:latin typeface="+mn-lt"/>
-                      </a:endParaRPr>
-                    </a:p>
-                  </a:txBody>
-                  <a:tcPr anchor="ctr">
-                    <a:lnL w="12700" cap="flat" cmpd="sng" algn="ctr">
-                      <a:solidFill>
-                        <a:schemeClr val="accent2">
-                          <a:lumMod val="75000"/>
-                        </a:schemeClr>
-                      </a:solidFill>
-                      <a:prstDash val="solid"/>
-                      <a:round/>
-                      <a:headEnd type="none" w="med" len="med"/>
-                      <a:tailEnd type="none" w="med" len="med"/>
-                    </a:lnL>
-                    <a:lnR w="38100" cap="flat" cmpd="sng" algn="ctr">
-                      <a:noFill/>
-                      <a:prstDash val="solid"/>
-                      <a:round/>
-                      <a:headEnd type="none" w="med" len="med"/>
-                      <a:tailEnd type="none" w="med" len="med"/>
-                    </a:lnR>
-                    <a:lnT w="12700" cap="flat" cmpd="sng" algn="ctr">
-                      <a:solidFill>
-                        <a:schemeClr val="accent2">
-                          <a:lumMod val="75000"/>
-                        </a:schemeClr>
-                      </a:solidFill>
-                      <a:prstDash val="solid"/>
-                      <a:round/>
-                      <a:headEnd type="none" w="med" len="med"/>
-                      <a:tailEnd type="none" w="med" len="med"/>
-                    </a:lnT>
-                    <a:lnB w="12700" cap="flat" cmpd="sng" algn="ctr">
-                      <a:solidFill>
-                        <a:schemeClr val="accent2">
-                          <a:lumMod val="75000"/>
-                        </a:schemeClr>
-                      </a:solidFill>
-                      <a:prstDash val="solid"/>
-                      <a:round/>
-                      <a:headEnd type="none" w="med" len="med"/>
-                      <a:tailEnd type="none" w="med" len="med"/>
-                    </a:lnB>
-                    <a:solidFill>
-                      <a:schemeClr val="accent5"/>
-                    </a:solidFill>
-                  </a:tcPr>
-                </a:tc>
-                <a:extLst>
-                  <a:ext uri="{0D108BD9-81ED-4DB2-BD59-A6C34878D82A}">
-                    <a16:rowId xmlns:a16="http://schemas.microsoft.com/office/drawing/2014/main" val="3472044516"/>
-                  </a:ext>
-                </a:extLst>
-              </a:tr>
-            </a:tbl>
-          </a:graphicData>
-        </a:graphic>
-      </p:graphicFrame>
-      <p:sp>
-        <p:nvSpPr>
-          <p:cNvPr id="2" name="Slide Number Placeholder 1">
-            <a:extLst>
-              <a:ext uri="{FF2B5EF4-FFF2-40B4-BE49-F238E27FC236}">
-                <a16:creationId xmlns:a16="http://schemas.microsoft.com/office/drawing/2014/main" id="{E4398C1C-6656-4A73-A680-62A81CDC27FD}"/>
+                <a16:creationId xmlns:a16="http://schemas.microsoft.com/office/drawing/2014/main" id="{2BE02B03-E98D-4D44-BCDD-16BE8F8CDFA0}"/>
               </a:ext>
             </a:extLst>
           </p:cNvPr>
@@ -27808,40 +27167,521 @@
           <a:lstStyle/>
           <a:p>
             <a:fld id="{C263D6C4-4840-40CC-AC84-17E24B3B7BDE}" type="slidenum">
-              <a:rPr lang="en-US" smtClean="0"/>
+              <a:rPr lang="en-US" noProof="0" smtClean="0"/>
               <a:pPr/>
               <a:t>4</a:t>
             </a:fld>
-            <a:endParaRPr lang="en-US" dirty="0"/>
+            <a:endParaRPr lang="en-US" noProof="0" dirty="0"/>
           </a:p>
         </p:txBody>
       </p:sp>
+      <p:sp>
+        <p:nvSpPr>
+          <p:cNvPr id="7" name="Rectangle 6">
+            <a:extLst>
+              <a:ext uri="{FF2B5EF4-FFF2-40B4-BE49-F238E27FC236}">
+                <a16:creationId xmlns:a16="http://schemas.microsoft.com/office/drawing/2014/main" id="{05C62BC9-54C5-4B63-B97D-38E84EC63A7E}"/>
+              </a:ext>
+            </a:extLst>
+          </p:cNvPr>
+          <p:cNvSpPr/>
+          <p:nvPr/>
+        </p:nvSpPr>
+        <p:spPr>
+          <a:xfrm>
+            <a:off x="0" y="1402672"/>
+            <a:ext cx="12192000" cy="4785064"/>
+          </a:xfrm>
+          <a:prstGeom prst="rect">
+            <a:avLst/>
+          </a:prstGeom>
+          <a:solidFill>
+            <a:schemeClr val="bg1"/>
+          </a:solidFill>
+        </p:spPr>
+        <p:style>
+          <a:lnRef idx="2">
+            <a:schemeClr val="accent1">
+              <a:shade val="50000"/>
+            </a:schemeClr>
+          </a:lnRef>
+          <a:fillRef idx="1">
+            <a:schemeClr val="accent1"/>
+          </a:fillRef>
+          <a:effectRef idx="0">
+            <a:schemeClr val="accent1"/>
+          </a:effectRef>
+          <a:fontRef idx="minor">
+            <a:schemeClr val="lt1"/>
+          </a:fontRef>
+        </p:style>
+        <p:txBody>
+          <a:bodyPr rtlCol="0" anchor="ctr"/>
+          <a:lstStyle/>
+          <a:p>
+            <a:pPr algn="ctr"/>
+            <a:endParaRPr lang="en-IN"/>
+          </a:p>
+        </p:txBody>
+      </p:sp>
+      <p:pic>
+        <p:nvPicPr>
+          <p:cNvPr id="1028" name="Picture 4">
+            <a:extLst>
+              <a:ext uri="{FF2B5EF4-FFF2-40B4-BE49-F238E27FC236}">
+                <a16:creationId xmlns:a16="http://schemas.microsoft.com/office/drawing/2014/main" id="{D5543110-BBA9-42AD-A152-B6A617C3B8FF}"/>
+              </a:ext>
+            </a:extLst>
+          </p:cNvPr>
+          <p:cNvPicPr>
+            <a:picLocks noChangeAspect="1" noChangeArrowheads="1"/>
+          </p:cNvPicPr>
+          <p:nvPr/>
+        </p:nvPicPr>
+        <p:blipFill>
+          <a:blip r:embed="rId2">
+            <a:extLst>
+              <a:ext uri="{28A0092B-C50C-407E-A947-70E740481C1C}">
+                <a14:useLocalDpi xmlns:a14="http://schemas.microsoft.com/office/drawing/2010/main" val="0"/>
+              </a:ext>
+            </a:extLst>
+          </a:blip>
+          <a:srcRect/>
+          <a:stretch>
+            <a:fillRect/>
+          </a:stretch>
+        </p:blipFill>
+        <p:spPr bwMode="auto">
+          <a:xfrm>
+            <a:off x="-1" y="2058928"/>
+            <a:ext cx="5967489" cy="3605018"/>
+          </a:xfrm>
+          <a:prstGeom prst="rect">
+            <a:avLst/>
+          </a:prstGeom>
+          <a:noFill/>
+          <a:extLst>
+            <a:ext uri="{909E8E84-426E-40DD-AFC4-6F175D3DCCD1}">
+              <a14:hiddenFill xmlns:a14="http://schemas.microsoft.com/office/drawing/2010/main">
+                <a:solidFill>
+                  <a:srgbClr val="FFFFFF"/>
+                </a:solidFill>
+              </a14:hiddenFill>
+            </a:ext>
+          </a:extLst>
+        </p:spPr>
+      </p:pic>
+      <p:pic>
+        <p:nvPicPr>
+          <p:cNvPr id="1030" name="Picture 6">
+            <a:extLst>
+              <a:ext uri="{FF2B5EF4-FFF2-40B4-BE49-F238E27FC236}">
+                <a16:creationId xmlns:a16="http://schemas.microsoft.com/office/drawing/2014/main" id="{DCC4EE9A-9877-4F15-ADF0-C4F76A33AFFC}"/>
+              </a:ext>
+            </a:extLst>
+          </p:cNvPr>
+          <p:cNvPicPr>
+            <a:picLocks noChangeAspect="1" noChangeArrowheads="1"/>
+          </p:cNvPicPr>
+          <p:nvPr/>
+        </p:nvPicPr>
+        <p:blipFill>
+          <a:blip r:embed="rId3">
+            <a:extLst>
+              <a:ext uri="{28A0092B-C50C-407E-A947-70E740481C1C}">
+                <a14:useLocalDpi xmlns:a14="http://schemas.microsoft.com/office/drawing/2010/main" val="0"/>
+              </a:ext>
+            </a:extLst>
+          </a:blip>
+          <a:srcRect/>
+          <a:stretch>
+            <a:fillRect/>
+          </a:stretch>
+        </p:blipFill>
+        <p:spPr bwMode="auto">
+          <a:xfrm>
+            <a:off x="5967488" y="2058928"/>
+            <a:ext cx="5971251" cy="3607290"/>
+          </a:xfrm>
+          <a:prstGeom prst="rect">
+            <a:avLst/>
+          </a:prstGeom>
+          <a:noFill/>
+          <a:extLst>
+            <a:ext uri="{909E8E84-426E-40DD-AFC4-6F175D3DCCD1}">
+              <a14:hiddenFill xmlns:a14="http://schemas.microsoft.com/office/drawing/2010/main">
+                <a:solidFill>
+                  <a:srgbClr val="FFFFFF"/>
+                </a:solidFill>
+              </a14:hiddenFill>
+            </a:ext>
+          </a:extLst>
+        </p:spPr>
+      </p:pic>
     </p:spTree>
     <p:extLst>
       <p:ext uri="{BB962C8B-B14F-4D97-AF65-F5344CB8AC3E}">
-        <p14:creationId xmlns:p14="http://schemas.microsoft.com/office/powerpoint/2010/main" val="1065425595"/>
+        <p14:creationId xmlns:p14="http://schemas.microsoft.com/office/powerpoint/2010/main" val="176648406"/>
       </p:ext>
     </p:extLst>
   </p:cSld>
   <p:clrMapOvr>
     <a:masterClrMapping/>
   </p:clrMapOvr>
-  <mc:AlternateContent xmlns:mc="http://schemas.openxmlformats.org/markup-compatibility/2006" xmlns:p14="http://schemas.microsoft.com/office/powerpoint/2010/main">
-    <mc:Choice Requires="p14">
-      <p:transition spd="med" p14:dur="700">
-        <p:fade/>
-      </p:transition>
-    </mc:Choice>
-    <mc:Fallback xmlns="">
-      <p:transition spd="med">
-        <p:fade/>
-      </p:transition>
-    </mc:Fallback>
-  </mc:AlternateContent>
 </p:sld>
 </file>
 
 <file path=ppt/slides/slide5.xml><?xml version="1.0" encoding="utf-8"?>
+<p:sld xmlns:a="http://schemas.openxmlformats.org/drawingml/2006/main" xmlns:r="http://schemas.openxmlformats.org/officeDocument/2006/relationships" xmlns:p="http://schemas.openxmlformats.org/presentationml/2006/main">
+  <p:cSld>
+    <p:spTree>
+      <p:nvGrpSpPr>
+        <p:cNvPr id="1" name=""/>
+        <p:cNvGrpSpPr/>
+        <p:nvPr/>
+      </p:nvGrpSpPr>
+      <p:grpSpPr>
+        <a:xfrm>
+          <a:off x="0" y="0"/>
+          <a:ext cx="0" cy="0"/>
+          <a:chOff x="0" y="0"/>
+          <a:chExt cx="0" cy="0"/>
+        </a:xfrm>
+      </p:grpSpPr>
+      <p:sp>
+        <p:nvSpPr>
+          <p:cNvPr id="2" name="Title 1">
+            <a:extLst>
+              <a:ext uri="{FF2B5EF4-FFF2-40B4-BE49-F238E27FC236}">
+                <a16:creationId xmlns:a16="http://schemas.microsoft.com/office/drawing/2014/main" id="{4F237B7A-DBF7-497D-B67F-9961C27872E8}"/>
+              </a:ext>
+            </a:extLst>
+          </p:cNvPr>
+          <p:cNvSpPr>
+            <a:spLocks noGrp="1"/>
+          </p:cNvSpPr>
+          <p:nvPr>
+            <p:ph type="title"/>
+          </p:nvPr>
+        </p:nvSpPr>
+        <p:spPr/>
+        <p:txBody>
+          <a:bodyPr/>
+          <a:lstStyle/>
+          <a:p>
+            <a:r>
+              <a:rPr lang="en-IN" dirty="0"/>
+              <a:t>Hyperparameter Tuning Results</a:t>
+            </a:r>
+          </a:p>
+        </p:txBody>
+      </p:sp>
+      <p:sp>
+        <p:nvSpPr>
+          <p:cNvPr id="3" name="Slide Number Placeholder 2">
+            <a:extLst>
+              <a:ext uri="{FF2B5EF4-FFF2-40B4-BE49-F238E27FC236}">
+                <a16:creationId xmlns:a16="http://schemas.microsoft.com/office/drawing/2014/main" id="{2BE02B03-E98D-4D44-BCDD-16BE8F8CDFA0}"/>
+              </a:ext>
+            </a:extLst>
+          </p:cNvPr>
+          <p:cNvSpPr>
+            <a:spLocks noGrp="1"/>
+          </p:cNvSpPr>
+          <p:nvPr>
+            <p:ph type="sldNum" sz="quarter" idx="12"/>
+          </p:nvPr>
+        </p:nvSpPr>
+        <p:spPr/>
+        <p:txBody>
+          <a:bodyPr/>
+          <a:lstStyle/>
+          <a:p>
+            <a:fld id="{C263D6C4-4840-40CC-AC84-17E24B3B7BDE}" type="slidenum">
+              <a:rPr lang="en-US" noProof="0" smtClean="0"/>
+              <a:pPr/>
+              <a:t>5</a:t>
+            </a:fld>
+            <a:endParaRPr lang="en-US" noProof="0" dirty="0"/>
+          </a:p>
+        </p:txBody>
+      </p:sp>
+      <p:sp>
+        <p:nvSpPr>
+          <p:cNvPr id="7" name="Rectangle 6">
+            <a:extLst>
+              <a:ext uri="{FF2B5EF4-FFF2-40B4-BE49-F238E27FC236}">
+                <a16:creationId xmlns:a16="http://schemas.microsoft.com/office/drawing/2014/main" id="{05C62BC9-54C5-4B63-B97D-38E84EC63A7E}"/>
+              </a:ext>
+            </a:extLst>
+          </p:cNvPr>
+          <p:cNvSpPr/>
+          <p:nvPr/>
+        </p:nvSpPr>
+        <p:spPr>
+          <a:xfrm>
+            <a:off x="0" y="1402672"/>
+            <a:ext cx="12192000" cy="4785064"/>
+          </a:xfrm>
+          <a:prstGeom prst="rect">
+            <a:avLst/>
+          </a:prstGeom>
+          <a:solidFill>
+            <a:schemeClr val="bg1"/>
+          </a:solidFill>
+        </p:spPr>
+        <p:style>
+          <a:lnRef idx="2">
+            <a:schemeClr val="accent1">
+              <a:shade val="50000"/>
+            </a:schemeClr>
+          </a:lnRef>
+          <a:fillRef idx="1">
+            <a:schemeClr val="accent1"/>
+          </a:fillRef>
+          <a:effectRef idx="0">
+            <a:schemeClr val="accent1"/>
+          </a:effectRef>
+          <a:fontRef idx="minor">
+            <a:schemeClr val="lt1"/>
+          </a:fontRef>
+        </p:style>
+        <p:txBody>
+          <a:bodyPr rtlCol="0" anchor="ctr"/>
+          <a:lstStyle/>
+          <a:p>
+            <a:pPr algn="ctr"/>
+            <a:endParaRPr lang="en-IN"/>
+          </a:p>
+        </p:txBody>
+      </p:sp>
+      <p:pic>
+        <p:nvPicPr>
+          <p:cNvPr id="2050" name="Picture 2">
+            <a:extLst>
+              <a:ext uri="{FF2B5EF4-FFF2-40B4-BE49-F238E27FC236}">
+                <a16:creationId xmlns:a16="http://schemas.microsoft.com/office/drawing/2014/main" id="{FB74187D-AD7C-4128-86D5-5723F8C2E592}"/>
+              </a:ext>
+            </a:extLst>
+          </p:cNvPr>
+          <p:cNvPicPr>
+            <a:picLocks noChangeAspect="1" noChangeArrowheads="1"/>
+          </p:cNvPicPr>
+          <p:nvPr/>
+        </p:nvPicPr>
+        <p:blipFill>
+          <a:blip r:embed="rId2">
+            <a:extLst>
+              <a:ext uri="{28A0092B-C50C-407E-A947-70E740481C1C}">
+                <a14:useLocalDpi xmlns:a14="http://schemas.microsoft.com/office/drawing/2010/main" val="0"/>
+              </a:ext>
+            </a:extLst>
+          </a:blip>
+          <a:srcRect/>
+          <a:stretch>
+            <a:fillRect/>
+          </a:stretch>
+        </p:blipFill>
+        <p:spPr bwMode="auto">
+          <a:xfrm>
+            <a:off x="62144" y="1953329"/>
+            <a:ext cx="5852920" cy="3570038"/>
+          </a:xfrm>
+          <a:prstGeom prst="rect">
+            <a:avLst/>
+          </a:prstGeom>
+          <a:noFill/>
+          <a:extLst>
+            <a:ext uri="{909E8E84-426E-40DD-AFC4-6F175D3DCCD1}">
+              <a14:hiddenFill xmlns:a14="http://schemas.microsoft.com/office/drawing/2010/main">
+                <a:solidFill>
+                  <a:srgbClr val="FFFFFF"/>
+                </a:solidFill>
+              </a14:hiddenFill>
+            </a:ext>
+          </a:extLst>
+        </p:spPr>
+      </p:pic>
+      <p:pic>
+        <p:nvPicPr>
+          <p:cNvPr id="2052" name="Picture 4">
+            <a:extLst>
+              <a:ext uri="{FF2B5EF4-FFF2-40B4-BE49-F238E27FC236}">
+                <a16:creationId xmlns:a16="http://schemas.microsoft.com/office/drawing/2014/main" id="{A0921B34-9748-4765-90E6-FD1AD891B886}"/>
+              </a:ext>
+            </a:extLst>
+          </p:cNvPr>
+          <p:cNvPicPr>
+            <a:picLocks noChangeAspect="1" noChangeArrowheads="1"/>
+          </p:cNvPicPr>
+          <p:nvPr/>
+        </p:nvPicPr>
+        <p:blipFill>
+          <a:blip r:embed="rId3">
+            <a:extLst>
+              <a:ext uri="{28A0092B-C50C-407E-A947-70E740481C1C}">
+                <a14:useLocalDpi xmlns:a14="http://schemas.microsoft.com/office/drawing/2010/main" val="0"/>
+              </a:ext>
+            </a:extLst>
+          </a:blip>
+          <a:srcRect/>
+          <a:stretch>
+            <a:fillRect/>
+          </a:stretch>
+        </p:blipFill>
+        <p:spPr bwMode="auto">
+          <a:xfrm>
+            <a:off x="6002788" y="1953329"/>
+            <a:ext cx="6127068" cy="3737257"/>
+          </a:xfrm>
+          <a:prstGeom prst="rect">
+            <a:avLst/>
+          </a:prstGeom>
+          <a:noFill/>
+          <a:extLst>
+            <a:ext uri="{909E8E84-426E-40DD-AFC4-6F175D3DCCD1}">
+              <a14:hiddenFill xmlns:a14="http://schemas.microsoft.com/office/drawing/2010/main">
+                <a:solidFill>
+                  <a:srgbClr val="FFFFFF"/>
+                </a:solidFill>
+              </a14:hiddenFill>
+            </a:ext>
+          </a:extLst>
+        </p:spPr>
+      </p:pic>
+    </p:spTree>
+    <p:extLst>
+      <p:ext uri="{BB962C8B-B14F-4D97-AF65-F5344CB8AC3E}">
+        <p14:creationId xmlns:p14="http://schemas.microsoft.com/office/powerpoint/2010/main" val="2214005705"/>
+      </p:ext>
+    </p:extLst>
+  </p:cSld>
+  <p:clrMapOvr>
+    <a:masterClrMapping/>
+  </p:clrMapOvr>
+</p:sld>
+</file>
+
+<file path=ppt/slides/slide6.xml><?xml version="1.0" encoding="utf-8"?>
+<p:sld xmlns:a="http://schemas.openxmlformats.org/drawingml/2006/main" xmlns:r="http://schemas.openxmlformats.org/officeDocument/2006/relationships" xmlns:p="http://schemas.openxmlformats.org/presentationml/2006/main">
+  <p:cSld>
+    <p:spTree>
+      <p:nvGrpSpPr>
+        <p:cNvPr id="1" name=""/>
+        <p:cNvGrpSpPr/>
+        <p:nvPr/>
+      </p:nvGrpSpPr>
+      <p:grpSpPr>
+        <a:xfrm>
+          <a:off x="0" y="0"/>
+          <a:ext cx="0" cy="0"/>
+          <a:chOff x="0" y="0"/>
+          <a:chExt cx="0" cy="0"/>
+        </a:xfrm>
+      </p:grpSpPr>
+      <p:sp>
+        <p:nvSpPr>
+          <p:cNvPr id="2" name="Title 1">
+            <a:extLst>
+              <a:ext uri="{FF2B5EF4-FFF2-40B4-BE49-F238E27FC236}">
+                <a16:creationId xmlns:a16="http://schemas.microsoft.com/office/drawing/2014/main" id="{51AE47B6-3C04-4864-91B4-5CBDB6077B3A}"/>
+              </a:ext>
+            </a:extLst>
+          </p:cNvPr>
+          <p:cNvSpPr>
+            <a:spLocks noGrp="1"/>
+          </p:cNvSpPr>
+          <p:nvPr>
+            <p:ph type="title"/>
+          </p:nvPr>
+        </p:nvSpPr>
+        <p:spPr/>
+        <p:txBody>
+          <a:bodyPr/>
+          <a:lstStyle/>
+          <a:p>
+            <a:r>
+              <a:rPr lang="en-IN" dirty="0"/>
+              <a:t>Performance on the Test Set</a:t>
+            </a:r>
+          </a:p>
+        </p:txBody>
+      </p:sp>
+      <p:sp>
+        <p:nvSpPr>
+          <p:cNvPr id="3" name="Slide Number Placeholder 2">
+            <a:extLst>
+              <a:ext uri="{FF2B5EF4-FFF2-40B4-BE49-F238E27FC236}">
+                <a16:creationId xmlns:a16="http://schemas.microsoft.com/office/drawing/2014/main" id="{F410A039-CCF8-4387-A430-C5470C503A9B}"/>
+              </a:ext>
+            </a:extLst>
+          </p:cNvPr>
+          <p:cNvSpPr>
+            <a:spLocks noGrp="1"/>
+          </p:cNvSpPr>
+          <p:nvPr>
+            <p:ph type="sldNum" sz="quarter" idx="12"/>
+          </p:nvPr>
+        </p:nvSpPr>
+        <p:spPr/>
+        <p:txBody>
+          <a:bodyPr/>
+          <a:lstStyle/>
+          <a:p>
+            <a:fld id="{C263D6C4-4840-40CC-AC84-17E24B3B7BDE}" type="slidenum">
+              <a:rPr lang="en-US" noProof="0" smtClean="0"/>
+              <a:pPr/>
+              <a:t>6</a:t>
+            </a:fld>
+            <a:endParaRPr lang="en-US" noProof="0" dirty="0"/>
+          </a:p>
+        </p:txBody>
+      </p:sp>
+      <p:graphicFrame>
+        <p:nvGraphicFramePr>
+          <p:cNvPr id="7" name="Content Placeholder 6">
+            <a:extLst>
+              <a:ext uri="{FF2B5EF4-FFF2-40B4-BE49-F238E27FC236}">
+                <a16:creationId xmlns:a16="http://schemas.microsoft.com/office/drawing/2014/main" id="{6E87B26B-F26F-4ED9-9CCC-DE9C4B2D901F}"/>
+              </a:ext>
+            </a:extLst>
+          </p:cNvPr>
+          <p:cNvGraphicFramePr>
+            <a:graphicFrameLocks noGrp="1"/>
+          </p:cNvGraphicFramePr>
+          <p:nvPr>
+            <p:ph idx="1"/>
+            <p:extLst>
+              <p:ext uri="{D42A27DB-BD31-4B8C-83A1-F6EECF244321}">
+                <p14:modId xmlns:p14="http://schemas.microsoft.com/office/powerpoint/2010/main" val="698329221"/>
+              </p:ext>
+            </p:extLst>
+          </p:nvPr>
+        </p:nvGraphicFramePr>
+        <p:xfrm>
+          <a:off x="133351" y="1428750"/>
+          <a:ext cx="11953874" cy="5105400"/>
+        </p:xfrm>
+        <a:graphic>
+          <a:graphicData uri="http://schemas.openxmlformats.org/drawingml/2006/chart">
+            <c:chart xmlns:c="http://schemas.openxmlformats.org/drawingml/2006/chart" xmlns:r="http://schemas.openxmlformats.org/officeDocument/2006/relationships" r:id="rId2"/>
+          </a:graphicData>
+        </a:graphic>
+      </p:graphicFrame>
+    </p:spTree>
+    <p:extLst>
+      <p:ext uri="{BB962C8B-B14F-4D97-AF65-F5344CB8AC3E}">
+        <p14:creationId xmlns:p14="http://schemas.microsoft.com/office/powerpoint/2010/main" val="3276805959"/>
+      </p:ext>
+    </p:extLst>
+  </p:cSld>
+  <p:clrMapOvr>
+    <a:masterClrMapping/>
+  </p:clrMapOvr>
+</p:sld>
+</file>
+
+<file path=ppt/slides/slide7.xml><?xml version="1.0" encoding="utf-8"?>
 <p:sld xmlns:a="http://schemas.openxmlformats.org/drawingml/2006/main" xmlns:r="http://schemas.openxmlformats.org/officeDocument/2006/relationships" xmlns:p="http://schemas.openxmlformats.org/presentationml/2006/main">
   <p:cSld>
     <p:spTree>
@@ -27910,7 +27750,7 @@
             <a:fld id="{C263D6C4-4840-40CC-AC84-17E24B3B7BDE}" type="slidenum">
               <a:rPr lang="en-US" noProof="0" smtClean="0"/>
               <a:pPr/>
-              <a:t>5</a:t>
+              <a:t>7</a:t>
             </a:fld>
             <a:endParaRPr lang="en-US" noProof="0" dirty="0"/>
           </a:p>
@@ -28589,7 +28429,7 @@
 </p:sld>
 </file>
 
-<file path=ppt/slides/slide6.xml><?xml version="1.0" encoding="utf-8"?>
+<file path=ppt/slides/slide8.xml><?xml version="1.0" encoding="utf-8"?>
 <p:sld xmlns:a="http://schemas.openxmlformats.org/drawingml/2006/main" xmlns:r="http://schemas.openxmlformats.org/officeDocument/2006/relationships" xmlns:p="http://schemas.openxmlformats.org/presentationml/2006/main">
   <p:cSld>
     <p:spTree>
@@ -28658,7 +28498,7 @@
             <a:fld id="{C263D6C4-4840-40CC-AC84-17E24B3B7BDE}" type="slidenum">
               <a:rPr lang="en-US" noProof="0" smtClean="0"/>
               <a:pPr/>
-              <a:t>6</a:t>
+              <a:t>8</a:t>
             </a:fld>
             <a:endParaRPr lang="en-US" noProof="0" dirty="0"/>
           </a:p>
@@ -28698,7 +28538,7 @@
           <a:p>
             <a:r>
               <a:rPr lang="en-IN" dirty="0"/>
-              <a:t>How to we address outliers, and reduce class imbalance?</a:t>
+              <a:t>How should we address outliers, and reduce class imbalance?</a:t>
             </a:r>
           </a:p>
           <a:p>
@@ -28735,8 +28575,8 @@
         </p:blipFill>
         <p:spPr bwMode="auto">
           <a:xfrm>
-            <a:off x="7109338" y="3429000"/>
-            <a:ext cx="4215557" cy="2448342"/>
+            <a:off x="5792992" y="3540479"/>
+            <a:ext cx="4777301" cy="2774596"/>
           </a:xfrm>
           <a:prstGeom prst="rect">
             <a:avLst/>
@@ -28775,7 +28615,7 @@
         </p:blipFill>
         <p:spPr>
           <a:xfrm>
-            <a:off x="8795244" y="3841080"/>
+            <a:off x="7428083" y="4199086"/>
             <a:ext cx="843747" cy="1457382"/>
           </a:xfrm>
           <a:prstGeom prst="rect">
@@ -28796,7 +28636,7 @@
 </p:sld>
 </file>
 
-<file path=ppt/slides/slide7.xml><?xml version="1.0" encoding="utf-8"?>
+<file path=ppt/slides/slide9.xml><?xml version="1.0" encoding="utf-8"?>
 <p:sld xmlns:a="http://schemas.openxmlformats.org/drawingml/2006/main" xmlns:r="http://schemas.openxmlformats.org/officeDocument/2006/relationships" xmlns:p="http://schemas.openxmlformats.org/presentationml/2006/main">
   <p:cSld>
     <p:spTree>
@@ -29650,23 +29490,6 @@
 </file>
 
 <file path=customXml/item1.xml><?xml version="1.0" encoding="utf-8"?>
-<p:properties xmlns:p="http://schemas.microsoft.com/office/2006/metadata/properties" xmlns:xsi="http://www.w3.org/2001/XMLSchema-instance" xmlns:pc="http://schemas.microsoft.com/office/infopath/2007/PartnerControls">
-  <documentManagement>
-    <MediaServiceKeyPoints xmlns="71af3243-3dd4-4a8d-8c0d-dd76da1f02a5" xsi:nil="true"/>
-  </documentManagement>
-</p:properties>
-</file>
-
-<file path=customXml/item2.xml><?xml version="1.0" encoding="utf-8"?>
-<?mso-contentType ?>
-<FormTemplates xmlns="http://schemas.microsoft.com/sharepoint/v3/contenttype/forms">
-  <Display>DocumentLibraryForm</Display>
-  <Edit>DocumentLibraryForm</Edit>
-  <New>DocumentLibraryForm</New>
-</FormTemplates>
-</file>
-
-<file path=customXml/item3.xml><?xml version="1.0" encoding="utf-8"?>
 <ct:contentTypeSchema xmlns:ct="http://schemas.microsoft.com/office/2006/metadata/contentType" xmlns:ma="http://schemas.microsoft.com/office/2006/metadata/properties/metaAttributes" ct:_="" ma:_="" ma:contentTypeName="Document" ma:contentTypeID="0x01010079F111ED35F8CC479449609E8A0923A6" ma:contentTypeVersion="11" ma:contentTypeDescription="Create a new document." ma:contentTypeScope="" ma:versionID="96291512c1ee715ab617f4c07df79fc1">
   <xsd:schema xmlns:xsd="http://www.w3.org/2001/XMLSchema" xmlns:xs="http://www.w3.org/2001/XMLSchema" xmlns:p="http://schemas.microsoft.com/office/2006/metadata/properties" xmlns:ns2="71af3243-3dd4-4a8d-8c0d-dd76da1f02a5" xmlns:ns3="16c05727-aa75-4e4a-9b5f-8a80a1165891" targetNamespace="http://schemas.microsoft.com/office/2006/metadata/properties" ma:root="true" ma:fieldsID="8256c27c40ca5c40ce1cf6c44f0205df" ns2:_="" ns3:_="">
     <xsd:import namespace="71af3243-3dd4-4a8d-8c0d-dd76da1f02a5"/>
@@ -29877,25 +29700,24 @@
 </ct:contentTypeSchema>
 </file>
 
-<file path=customXml/itemProps1.xml><?xml version="1.0" encoding="utf-8"?>
-<ds:datastoreItem xmlns:ds="http://schemas.openxmlformats.org/officeDocument/2006/customXml" ds:itemID="{F5757914-1161-4661-9696-421FD6935CDD}">
-  <ds:schemaRefs>
-    <ds:schemaRef ds:uri="http://schemas.microsoft.com/office/2006/metadata/properties"/>
-    <ds:schemaRef ds:uri="http://schemas.microsoft.com/office/infopath/2007/PartnerControls"/>
-    <ds:schemaRef ds:uri="71af3243-3dd4-4a8d-8c0d-dd76da1f02a5"/>
-  </ds:schemaRefs>
-</ds:datastoreItem>
+<file path=customXml/item2.xml><?xml version="1.0" encoding="utf-8"?>
+<?mso-contentType ?>
+<FormTemplates xmlns="http://schemas.microsoft.com/sharepoint/v3/contenttype/forms">
+  <Display>DocumentLibraryForm</Display>
+  <Edit>DocumentLibraryForm</Edit>
+  <New>DocumentLibraryForm</New>
+</FormTemplates>
 </file>
 
-<file path=customXml/itemProps2.xml><?xml version="1.0" encoding="utf-8"?>
-<ds:datastoreItem xmlns:ds="http://schemas.openxmlformats.org/officeDocument/2006/customXml" ds:itemID="{5B26E0C9-B2AA-42E6-97B6-E1B7D9EAF129}">
-  <ds:schemaRefs>
-    <ds:schemaRef ds:uri="http://schemas.microsoft.com/sharepoint/v3/contenttype/forms"/>
-  </ds:schemaRefs>
-</ds:datastoreItem>
+<file path=customXml/item3.xml><?xml version="1.0" encoding="utf-8"?>
+<p:properties xmlns:p="http://schemas.microsoft.com/office/2006/metadata/properties" xmlns:xsi="http://www.w3.org/2001/XMLSchema-instance" xmlns:pc="http://schemas.microsoft.com/office/infopath/2007/PartnerControls">
+  <documentManagement>
+    <MediaServiceKeyPoints xmlns="71af3243-3dd4-4a8d-8c0d-dd76da1f02a5" xsi:nil="true"/>
+  </documentManagement>
+</p:properties>
 </file>
 
-<file path=customXml/itemProps3.xml><?xml version="1.0" encoding="utf-8"?>
+<file path=customXml/itemProps1.xml><?xml version="1.0" encoding="utf-8"?>
 <ds:datastoreItem xmlns:ds="http://schemas.openxmlformats.org/officeDocument/2006/customXml" ds:itemID="{4C103400-4A22-4E35-B588-4C4D42638959}">
   <ds:schemaRefs>
     <ds:schemaRef ds:uri="http://schemas.microsoft.com/office/2006/metadata/contentType"/>
@@ -29912,4 +29734,22 @@
     <ds:schemaRef ds:uri="http://schemas.microsoft.com/internal/obd"/>
   </ds:schemaRefs>
 </ds:datastoreItem>
+</file>
+
+<file path=customXml/itemProps2.xml><?xml version="1.0" encoding="utf-8"?>
+<ds:datastoreItem xmlns:ds="http://schemas.openxmlformats.org/officeDocument/2006/customXml" ds:itemID="{5B26E0C9-B2AA-42E6-97B6-E1B7D9EAF129}">
+  <ds:schemaRefs>
+    <ds:schemaRef ds:uri="http://schemas.microsoft.com/sharepoint/v3/contenttype/forms"/>
+  </ds:schemaRefs>
+</ds:datastoreItem>
+</file>
+
+<file path=customXml/itemProps3.xml><?xml version="1.0" encoding="utf-8"?>
+<ds:datastoreItem xmlns:ds="http://schemas.openxmlformats.org/officeDocument/2006/customXml" ds:itemID="{F5757914-1161-4661-9696-421FD6935CDD}">
+  <ds:schemaRefs>
+    <ds:schemaRef ds:uri="http://schemas.microsoft.com/office/2006/metadata/properties"/>
+    <ds:schemaRef ds:uri="http://schemas.microsoft.com/office/infopath/2007/PartnerControls"/>
+    <ds:schemaRef ds:uri="71af3243-3dd4-4a8d-8c0d-dd76da1f02a5"/>
+  </ds:schemaRefs>
+</ds:datastoreItem>
 </file>
</xml_diff>